<commit_message>
Supprime commentaire et ajoute nom de variable dans le code d'optimisation du sac à dos
</commit_message>
<xml_diff>
--- a/doc/Comparaison_Algorithmes.pptx
+++ b/doc/Comparaison_Algorithmes.pptx
@@ -4,6 +4,9 @@
   <p:sldMasterIdLst>
     <p:sldMasterId id="2147483648" r:id="rId1"/>
   </p:sldMasterIdLst>
+  <p:notesMasterIdLst>
+    <p:notesMasterId r:id="rId9"/>
+  </p:notesMasterIdLst>
   <p:sldIdLst>
     <p:sldId id="256" r:id="rId2"/>
     <p:sldId id="257" r:id="rId3"/>
@@ -127,6 +130,439 @@
     </p:ext>
   </p:extLst>
 </p:presentation>
+</file>
+
+<file path=ppt/notesMasters/notesMaster1.xml><?xml version="1.0" encoding="utf-8"?>
+<p:notesMaster xmlns:a="http://schemas.openxmlformats.org/drawingml/2006/main" xmlns:r="http://schemas.openxmlformats.org/officeDocument/2006/relationships" xmlns:p="http://schemas.openxmlformats.org/presentationml/2006/main">
+  <p:cSld>
+    <p:bg>
+      <p:bgRef idx="1001">
+        <a:schemeClr val="bg1"/>
+      </p:bgRef>
+    </p:bg>
+    <p:spTree>
+      <p:nvGrpSpPr>
+        <p:cNvPr id="1" name=""/>
+        <p:cNvGrpSpPr/>
+        <p:nvPr/>
+      </p:nvGrpSpPr>
+      <p:grpSpPr>
+        <a:xfrm>
+          <a:off x="0" y="0"/>
+          <a:ext cx="0" cy="0"/>
+          <a:chOff x="0" y="0"/>
+          <a:chExt cx="0" cy="0"/>
+        </a:xfrm>
+      </p:grpSpPr>
+      <p:sp>
+        <p:nvSpPr>
+          <p:cNvPr id="2" name="Espace réservé de l'en-tête 1"/>
+          <p:cNvSpPr>
+            <a:spLocks noGrp="1"/>
+          </p:cNvSpPr>
+          <p:nvPr>
+            <p:ph type="hdr" sz="quarter"/>
+          </p:nvPr>
+        </p:nvSpPr>
+        <p:spPr>
+          <a:xfrm>
+            <a:off x="0" y="0"/>
+            <a:ext cx="2971800" cy="458788"/>
+          </a:xfrm>
+          <a:prstGeom prst="rect">
+            <a:avLst/>
+          </a:prstGeom>
+        </p:spPr>
+        <p:txBody>
+          <a:bodyPr vert="horz" lIns="91440" tIns="45720" rIns="91440" bIns="45720" rtlCol="0"/>
+          <a:lstStyle>
+            <a:lvl1pPr algn="l">
+              <a:defRPr sz="1200"/>
+            </a:lvl1pPr>
+          </a:lstStyle>
+          <a:p>
+            <a:endParaRPr lang="fr-FR"/>
+          </a:p>
+        </p:txBody>
+      </p:sp>
+      <p:sp>
+        <p:nvSpPr>
+          <p:cNvPr id="3" name="Espace réservé de la date 2"/>
+          <p:cNvSpPr>
+            <a:spLocks noGrp="1"/>
+          </p:cNvSpPr>
+          <p:nvPr>
+            <p:ph type="dt" idx="1"/>
+          </p:nvPr>
+        </p:nvSpPr>
+        <p:spPr>
+          <a:xfrm>
+            <a:off x="3884613" y="0"/>
+            <a:ext cx="2971800" cy="458788"/>
+          </a:xfrm>
+          <a:prstGeom prst="rect">
+            <a:avLst/>
+          </a:prstGeom>
+        </p:spPr>
+        <p:txBody>
+          <a:bodyPr vert="horz" lIns="91440" tIns="45720" rIns="91440" bIns="45720" rtlCol="0"/>
+          <a:lstStyle>
+            <a:lvl1pPr algn="r">
+              <a:defRPr sz="1200"/>
+            </a:lvl1pPr>
+          </a:lstStyle>
+          <a:p>
+            <a:fld id="{769EEA0F-A3B0-46FD-963C-0DBEB9F71F36}" type="datetimeFigureOut">
+              <a:rPr lang="fr-FR" smtClean="0"/>
+              <a:t>20/05/2025</a:t>
+            </a:fld>
+            <a:endParaRPr lang="fr-FR"/>
+          </a:p>
+        </p:txBody>
+      </p:sp>
+      <p:sp>
+        <p:nvSpPr>
+          <p:cNvPr id="4" name="Espace réservé de l'image des diapositives 3"/>
+          <p:cNvSpPr>
+            <a:spLocks noGrp="1" noRot="1" noChangeAspect="1"/>
+          </p:cNvSpPr>
+          <p:nvPr>
+            <p:ph type="sldImg" idx="2"/>
+          </p:nvPr>
+        </p:nvSpPr>
+        <p:spPr>
+          <a:xfrm>
+            <a:off x="1371600" y="1143000"/>
+            <a:ext cx="4114800" cy="3086100"/>
+          </a:xfrm>
+          <a:prstGeom prst="rect">
+            <a:avLst/>
+          </a:prstGeom>
+          <a:noFill/>
+          <a:ln w="12700">
+            <a:solidFill>
+              <a:prstClr val="black"/>
+            </a:solidFill>
+          </a:ln>
+        </p:spPr>
+        <p:txBody>
+          <a:bodyPr vert="horz" lIns="91440" tIns="45720" rIns="91440" bIns="45720" rtlCol="0" anchor="ctr"/>
+          <a:lstStyle/>
+          <a:p>
+            <a:endParaRPr lang="fr-FR"/>
+          </a:p>
+        </p:txBody>
+      </p:sp>
+      <p:sp>
+        <p:nvSpPr>
+          <p:cNvPr id="5" name="Espace réservé des notes 4"/>
+          <p:cNvSpPr>
+            <a:spLocks noGrp="1"/>
+          </p:cNvSpPr>
+          <p:nvPr>
+            <p:ph type="body" sz="quarter" idx="3"/>
+          </p:nvPr>
+        </p:nvSpPr>
+        <p:spPr>
+          <a:xfrm>
+            <a:off x="685800" y="4400550"/>
+            <a:ext cx="5486400" cy="3600450"/>
+          </a:xfrm>
+          <a:prstGeom prst="rect">
+            <a:avLst/>
+          </a:prstGeom>
+        </p:spPr>
+        <p:txBody>
+          <a:bodyPr vert="horz" lIns="91440" tIns="45720" rIns="91440" bIns="45720" rtlCol="0"/>
+          <a:lstStyle/>
+          <a:p>
+            <a:pPr lvl="0"/>
+            <a:r>
+              <a:rPr lang="fr-FR"/>
+              <a:t>Cliquez pour modifier les styles du texte du masque</a:t>
+            </a:r>
+          </a:p>
+          <a:p>
+            <a:pPr lvl="1"/>
+            <a:r>
+              <a:rPr lang="fr-FR"/>
+              <a:t>Deuxième niveau</a:t>
+            </a:r>
+          </a:p>
+          <a:p>
+            <a:pPr lvl="2"/>
+            <a:r>
+              <a:rPr lang="fr-FR"/>
+              <a:t>Troisième niveau</a:t>
+            </a:r>
+          </a:p>
+          <a:p>
+            <a:pPr lvl="3"/>
+            <a:r>
+              <a:rPr lang="fr-FR"/>
+              <a:t>Quatrième niveau</a:t>
+            </a:r>
+          </a:p>
+          <a:p>
+            <a:pPr lvl="4"/>
+            <a:r>
+              <a:rPr lang="fr-FR"/>
+              <a:t>Cinquième niveau</a:t>
+            </a:r>
+          </a:p>
+        </p:txBody>
+      </p:sp>
+      <p:sp>
+        <p:nvSpPr>
+          <p:cNvPr id="6" name="Espace réservé du pied de page 5"/>
+          <p:cNvSpPr>
+            <a:spLocks noGrp="1"/>
+          </p:cNvSpPr>
+          <p:nvPr>
+            <p:ph type="ftr" sz="quarter" idx="4"/>
+          </p:nvPr>
+        </p:nvSpPr>
+        <p:spPr>
+          <a:xfrm>
+            <a:off x="0" y="8685213"/>
+            <a:ext cx="2971800" cy="458787"/>
+          </a:xfrm>
+          <a:prstGeom prst="rect">
+            <a:avLst/>
+          </a:prstGeom>
+        </p:spPr>
+        <p:txBody>
+          <a:bodyPr vert="horz" lIns="91440" tIns="45720" rIns="91440" bIns="45720" rtlCol="0" anchor="b"/>
+          <a:lstStyle>
+            <a:lvl1pPr algn="l">
+              <a:defRPr sz="1200"/>
+            </a:lvl1pPr>
+          </a:lstStyle>
+          <a:p>
+            <a:endParaRPr lang="fr-FR"/>
+          </a:p>
+        </p:txBody>
+      </p:sp>
+      <p:sp>
+        <p:nvSpPr>
+          <p:cNvPr id="7" name="Espace réservé du numéro de diapositive 6"/>
+          <p:cNvSpPr>
+            <a:spLocks noGrp="1"/>
+          </p:cNvSpPr>
+          <p:nvPr>
+            <p:ph type="sldNum" sz="quarter" idx="5"/>
+          </p:nvPr>
+        </p:nvSpPr>
+        <p:spPr>
+          <a:xfrm>
+            <a:off x="3884613" y="8685213"/>
+            <a:ext cx="2971800" cy="458787"/>
+          </a:xfrm>
+          <a:prstGeom prst="rect">
+            <a:avLst/>
+          </a:prstGeom>
+        </p:spPr>
+        <p:txBody>
+          <a:bodyPr vert="horz" lIns="91440" tIns="45720" rIns="91440" bIns="45720" rtlCol="0" anchor="b"/>
+          <a:lstStyle>
+            <a:lvl1pPr algn="r">
+              <a:defRPr sz="1200"/>
+            </a:lvl1pPr>
+          </a:lstStyle>
+          <a:p>
+            <a:fld id="{D3CD7AE4-7DC1-44E7-B55B-429196035583}" type="slidenum">
+              <a:rPr lang="fr-FR" smtClean="0"/>
+              <a:t>‹N°›</a:t>
+            </a:fld>
+            <a:endParaRPr lang="fr-FR"/>
+          </a:p>
+        </p:txBody>
+      </p:sp>
+    </p:spTree>
+    <p:extLst>
+      <p:ext uri="{BB962C8B-B14F-4D97-AF65-F5344CB8AC3E}">
+        <p14:creationId xmlns:p14="http://schemas.microsoft.com/office/powerpoint/2010/main" val="3366999178"/>
+      </p:ext>
+    </p:extLst>
+  </p:cSld>
+  <p:clrMap bg1="lt1" tx1="dk1" bg2="lt2" tx2="dk2" accent1="accent1" accent2="accent2" accent3="accent3" accent4="accent4" accent5="accent5" accent6="accent6" hlink="hlink" folHlink="folHlink"/>
+  <p:notesStyle>
+    <a:lvl1pPr marL="0" algn="l" defTabSz="914400" rtl="0" eaLnBrk="1" latinLnBrk="0" hangingPunct="1">
+      <a:defRPr sz="1200" kern="1200">
+        <a:solidFill>
+          <a:schemeClr val="tx1"/>
+        </a:solidFill>
+        <a:latin typeface="+mn-lt"/>
+        <a:ea typeface="+mn-ea"/>
+        <a:cs typeface="+mn-cs"/>
+      </a:defRPr>
+    </a:lvl1pPr>
+    <a:lvl2pPr marL="457200" algn="l" defTabSz="914400" rtl="0" eaLnBrk="1" latinLnBrk="0" hangingPunct="1">
+      <a:defRPr sz="1200" kern="1200">
+        <a:solidFill>
+          <a:schemeClr val="tx1"/>
+        </a:solidFill>
+        <a:latin typeface="+mn-lt"/>
+        <a:ea typeface="+mn-ea"/>
+        <a:cs typeface="+mn-cs"/>
+      </a:defRPr>
+    </a:lvl2pPr>
+    <a:lvl3pPr marL="914400" algn="l" defTabSz="914400" rtl="0" eaLnBrk="1" latinLnBrk="0" hangingPunct="1">
+      <a:defRPr sz="1200" kern="1200">
+        <a:solidFill>
+          <a:schemeClr val="tx1"/>
+        </a:solidFill>
+        <a:latin typeface="+mn-lt"/>
+        <a:ea typeface="+mn-ea"/>
+        <a:cs typeface="+mn-cs"/>
+      </a:defRPr>
+    </a:lvl3pPr>
+    <a:lvl4pPr marL="1371600" algn="l" defTabSz="914400" rtl="0" eaLnBrk="1" latinLnBrk="0" hangingPunct="1">
+      <a:defRPr sz="1200" kern="1200">
+        <a:solidFill>
+          <a:schemeClr val="tx1"/>
+        </a:solidFill>
+        <a:latin typeface="+mn-lt"/>
+        <a:ea typeface="+mn-ea"/>
+        <a:cs typeface="+mn-cs"/>
+      </a:defRPr>
+    </a:lvl4pPr>
+    <a:lvl5pPr marL="1828800" algn="l" defTabSz="914400" rtl="0" eaLnBrk="1" latinLnBrk="0" hangingPunct="1">
+      <a:defRPr sz="1200" kern="1200">
+        <a:solidFill>
+          <a:schemeClr val="tx1"/>
+        </a:solidFill>
+        <a:latin typeface="+mn-lt"/>
+        <a:ea typeface="+mn-ea"/>
+        <a:cs typeface="+mn-cs"/>
+      </a:defRPr>
+    </a:lvl5pPr>
+    <a:lvl6pPr marL="2286000" algn="l" defTabSz="914400" rtl="0" eaLnBrk="1" latinLnBrk="0" hangingPunct="1">
+      <a:defRPr sz="1200" kern="1200">
+        <a:solidFill>
+          <a:schemeClr val="tx1"/>
+        </a:solidFill>
+        <a:latin typeface="+mn-lt"/>
+        <a:ea typeface="+mn-ea"/>
+        <a:cs typeface="+mn-cs"/>
+      </a:defRPr>
+    </a:lvl6pPr>
+    <a:lvl7pPr marL="2743200" algn="l" defTabSz="914400" rtl="0" eaLnBrk="1" latinLnBrk="0" hangingPunct="1">
+      <a:defRPr sz="1200" kern="1200">
+        <a:solidFill>
+          <a:schemeClr val="tx1"/>
+        </a:solidFill>
+        <a:latin typeface="+mn-lt"/>
+        <a:ea typeface="+mn-ea"/>
+        <a:cs typeface="+mn-cs"/>
+      </a:defRPr>
+    </a:lvl7pPr>
+    <a:lvl8pPr marL="3200400" algn="l" defTabSz="914400" rtl="0" eaLnBrk="1" latinLnBrk="0" hangingPunct="1">
+      <a:defRPr sz="1200" kern="1200">
+        <a:solidFill>
+          <a:schemeClr val="tx1"/>
+        </a:solidFill>
+        <a:latin typeface="+mn-lt"/>
+        <a:ea typeface="+mn-ea"/>
+        <a:cs typeface="+mn-cs"/>
+      </a:defRPr>
+    </a:lvl8pPr>
+    <a:lvl9pPr marL="3657600" algn="l" defTabSz="914400" rtl="0" eaLnBrk="1" latinLnBrk="0" hangingPunct="1">
+      <a:defRPr sz="1200" kern="1200">
+        <a:solidFill>
+          <a:schemeClr val="tx1"/>
+        </a:solidFill>
+        <a:latin typeface="+mn-lt"/>
+        <a:ea typeface="+mn-ea"/>
+        <a:cs typeface="+mn-cs"/>
+      </a:defRPr>
+    </a:lvl9pPr>
+  </p:notesStyle>
+</p:notesMaster>
+</file>
+
+<file path=ppt/notesSlides/notesSlide1.xml><?xml version="1.0" encoding="utf-8"?>
+<p:notes xmlns:a="http://schemas.openxmlformats.org/drawingml/2006/main" xmlns:r="http://schemas.openxmlformats.org/officeDocument/2006/relationships" xmlns:p="http://schemas.openxmlformats.org/presentationml/2006/main">
+  <p:cSld>
+    <p:spTree>
+      <p:nvGrpSpPr>
+        <p:cNvPr id="1" name=""/>
+        <p:cNvGrpSpPr/>
+        <p:nvPr/>
+      </p:nvGrpSpPr>
+      <p:grpSpPr>
+        <a:xfrm>
+          <a:off x="0" y="0"/>
+          <a:ext cx="0" cy="0"/>
+          <a:chOff x="0" y="0"/>
+          <a:chExt cx="0" cy="0"/>
+        </a:xfrm>
+      </p:grpSpPr>
+      <p:sp>
+        <p:nvSpPr>
+          <p:cNvPr id="2" name="Espace réservé de l'image des diapositives 1"/>
+          <p:cNvSpPr>
+            <a:spLocks noGrp="1" noRot="1" noChangeAspect="1"/>
+          </p:cNvSpPr>
+          <p:nvPr>
+            <p:ph type="sldImg"/>
+          </p:nvPr>
+        </p:nvSpPr>
+        <p:spPr/>
+      </p:sp>
+      <p:sp>
+        <p:nvSpPr>
+          <p:cNvPr id="3" name="Espace réservé des notes 2"/>
+          <p:cNvSpPr>
+            <a:spLocks noGrp="1"/>
+          </p:cNvSpPr>
+          <p:nvPr>
+            <p:ph type="body" idx="1"/>
+          </p:nvPr>
+        </p:nvSpPr>
+        <p:spPr/>
+        <p:txBody>
+          <a:bodyPr/>
+          <a:lstStyle/>
+          <a:p>
+            <a:endParaRPr lang="fr-FR" dirty="0"/>
+          </a:p>
+        </p:txBody>
+      </p:sp>
+      <p:sp>
+        <p:nvSpPr>
+          <p:cNvPr id="4" name="Espace réservé du numéro de diapositive 3"/>
+          <p:cNvSpPr>
+            <a:spLocks noGrp="1"/>
+          </p:cNvSpPr>
+          <p:nvPr>
+            <p:ph type="sldNum" sz="quarter" idx="5"/>
+          </p:nvPr>
+        </p:nvSpPr>
+        <p:spPr/>
+        <p:txBody>
+          <a:bodyPr/>
+          <a:lstStyle/>
+          <a:p>
+            <a:fld id="{D3CD7AE4-7DC1-44E7-B55B-429196035583}" type="slidenum">
+              <a:rPr lang="fr-FR" smtClean="0"/>
+              <a:t>3</a:t>
+            </a:fld>
+            <a:endParaRPr lang="fr-FR"/>
+          </a:p>
+        </p:txBody>
+      </p:sp>
+    </p:spTree>
+    <p:extLst>
+      <p:ext uri="{BB962C8B-B14F-4D97-AF65-F5344CB8AC3E}">
+        <p14:creationId xmlns:p14="http://schemas.microsoft.com/office/powerpoint/2010/main" val="3788718693"/>
+      </p:ext>
+    </p:extLst>
+  </p:cSld>
+  <p:clrMapOvr>
+    <a:masterClrMapping/>
+  </p:clrMapOvr>
+</p:notes>
 </file>
 
 <file path=ppt/slideLayouts/slideLayout1.xml><?xml version="1.0" encoding="utf-8"?>
@@ -3212,7 +3648,7 @@
           <a:p>
             <a:r>
               <a:rPr lang="fr-FR" dirty="0"/>
-              <a:t>✅ Pseudocode de la solution optimisée</a:t>
+              <a:t>⌨️Pseudocode de la solution optimisée</a:t>
             </a:r>
           </a:p>
         </p:txBody>
@@ -3230,7 +3666,7 @@
         <p:spPr/>
         <p:txBody>
           <a:bodyPr>
-            <a:normAutofit fontScale="85000" lnSpcReduction="20000"/>
+            <a:normAutofit fontScale="77500" lnSpcReduction="20000"/>
           </a:bodyPr>
           <a:lstStyle/>
           <a:p>
@@ -3299,7 +3735,25 @@
             </a:r>
             <a:r>
               <a:rPr lang="fr-FR" dirty="0"/>
-              <a:t>[i][budget] = max(</a:t>
+              <a:t>[i][budget] = max(bénéfice action précédente pour budget, meilleure profit action + profit)</a:t>
+            </a:r>
+          </a:p>
+          <a:p>
+            <a:pPr marL="0" indent="0">
+              <a:buNone/>
+            </a:pPr>
+            <a:r>
+              <a:rPr lang="fr-FR" dirty="0"/>
+              <a:t>      ii. Sinon :</a:t>
+            </a:r>
+          </a:p>
+          <a:p>
+            <a:pPr marL="0" indent="0">
+              <a:buNone/>
+            </a:pPr>
+            <a:r>
+              <a:rPr lang="fr-FR" dirty="0"/>
+              <a:t>         - </a:t>
             </a:r>
             <a:r>
               <a:rPr lang="fr-FR" dirty="0" err="1"/>
@@ -3307,57 +3761,7 @@
             </a:r>
             <a:r>
               <a:rPr lang="fr-FR" dirty="0"/>
-              <a:t>[i-1][budget], </a:t>
-            </a:r>
-            <a:r>
-              <a:rPr lang="fr-FR" dirty="0" err="1"/>
-              <a:t>dp</a:t>
-            </a:r>
-            <a:r>
-              <a:rPr lang="fr-FR" dirty="0"/>
-              <a:t>[i-1][budget - </a:t>
-            </a:r>
-            <a:r>
-              <a:rPr lang="fr-FR" dirty="0" err="1"/>
-              <a:t>cost</a:t>
-            </a:r>
-            <a:r>
-              <a:rPr lang="fr-FR" dirty="0"/>
-              <a:t>] + profit)</a:t>
-            </a:r>
-          </a:p>
-          <a:p>
-            <a:pPr marL="0" indent="0">
-              <a:buNone/>
-            </a:pPr>
-            <a:r>
-              <a:rPr lang="fr-FR" dirty="0"/>
-              <a:t>      ii. Sinon :</a:t>
-            </a:r>
-          </a:p>
-          <a:p>
-            <a:pPr marL="0" indent="0">
-              <a:buNone/>
-            </a:pPr>
-            <a:r>
-              <a:rPr lang="fr-FR" dirty="0"/>
-              <a:t>         - </a:t>
-            </a:r>
-            <a:r>
-              <a:rPr lang="fr-FR" dirty="0" err="1"/>
-              <a:t>dp</a:t>
-            </a:r>
-            <a:r>
-              <a:rPr lang="fr-FR" dirty="0"/>
-              <a:t>[i][budget] = </a:t>
-            </a:r>
-            <a:r>
-              <a:rPr lang="fr-FR" dirty="0" err="1"/>
-              <a:t>dp</a:t>
-            </a:r>
-            <a:r>
-              <a:rPr lang="fr-FR" dirty="0"/>
-              <a:t>[i-1][budget]</a:t>
+              <a:t>[i][budget] = bénéfice action précédente pour budget</a:t>
             </a:r>
           </a:p>
           <a:p>
@@ -3422,8 +3826,42 @@
           <a:lstStyle/>
           <a:p>
             <a:r>
-              <a:t>Description de l'algorithme optimisé et ses limites</a:t>
-            </a:r>
+              <a:rPr lang="fr-FR" dirty="0"/>
+              <a:t>✅ </a:t>
+            </a:r>
+            <a:r>
+              <a:rPr dirty="0"/>
+              <a:t>Description de </a:t>
+            </a:r>
+            <a:r>
+              <a:rPr dirty="0" err="1"/>
+              <a:t>l'algorithme</a:t>
+            </a:r>
+            <a:r>
+              <a:rPr dirty="0"/>
+              <a:t> </a:t>
+            </a:r>
+            <a:r>
+              <a:rPr dirty="0" err="1"/>
+              <a:t>optimisé</a:t>
+            </a:r>
+            <a:r>
+              <a:rPr dirty="0"/>
+              <a:t> et </a:t>
+            </a:r>
+            <a:r>
+              <a:rPr dirty="0" err="1"/>
+              <a:t>ses</a:t>
+            </a:r>
+            <a:r>
+              <a:rPr dirty="0"/>
+              <a:t> </a:t>
+            </a:r>
+            <a:r>
+              <a:rPr dirty="0" err="1"/>
+              <a:t>limites</a:t>
+            </a:r>
+            <a:endParaRPr dirty="0"/>
           </a:p>
         </p:txBody>
       </p:sp>
@@ -3488,7 +3926,7 @@
           <a:p>
             <a:r>
               <a:rPr lang="fr-FR" dirty="0"/>
-              <a:t>Limites : Nécessite une quantité de mémoire proportionnelle au budget et au nombre d'actions. Peut ne pas être efficace pour des budgets très élevés ou un très grand nombre d'actions.</a:t>
+              <a:t>Limites : nécessite beaucoup de mémoire en fonction du budget et du nombre d'actions, et peut être inefficace pour des montants de budgets très élevés ou un grand nombre d'actions.</a:t>
             </a:r>
           </a:p>
         </p:txBody>
@@ -3942,13 +4380,33 @@
             <p:ph type="ctrTitle"/>
           </p:nvPr>
         </p:nvSpPr>
-        <p:spPr/>
+        <p:spPr>
+          <a:xfrm>
+            <a:off x="685800" y="4398137"/>
+            <a:ext cx="7772400" cy="1470025"/>
+          </a:xfrm>
+        </p:spPr>
+        <p:style>
+          <a:lnRef idx="2">
+            <a:schemeClr val="accent5"/>
+          </a:lnRef>
+          <a:fillRef idx="1">
+            <a:schemeClr val="lt1"/>
+          </a:fillRef>
+          <a:effectRef idx="0">
+            <a:schemeClr val="accent5"/>
+          </a:effectRef>
+          <a:fontRef idx="minor">
+            <a:schemeClr val="dk1"/>
+          </a:fontRef>
+        </p:style>
         <p:txBody>
           <a:bodyPr>
-            <a:normAutofit/>
+            <a:normAutofit fontScale="90000"/>
           </a:bodyPr>
           <a:lstStyle/>
           <a:p>
+            <a:pPr algn="l"/>
             <a:r>
               <a:rPr lang="fr-FR" sz="2800" b="0" i="0" dirty="0">
                 <a:solidFill>
@@ -3957,7 +4415,45 @@
                 <a:effectLst/>
                 <a:latin typeface="Segoe Sans"/>
               </a:rPr>
-              <a:t>Les deux fichiers ont été nettoyés (suppression des prix négatifs ou nuls, filtrage des bénéfices excessifs (supérieurs à 40%)).</a:t>
+              <a:t>ℹ️ Les deux fichiers csv ont été nettoyés :</a:t>
+            </a:r>
+            <a:br>
+              <a:rPr lang="fr-FR" sz="2800" b="0" i="0" dirty="0">
+                <a:solidFill>
+                  <a:srgbClr val="424242"/>
+                </a:solidFill>
+                <a:effectLst/>
+                <a:latin typeface="Segoe Sans"/>
+              </a:rPr>
+            </a:br>
+            <a:r>
+              <a:rPr lang="fr-FR" sz="2800" b="0" i="0" dirty="0">
+                <a:solidFill>
+                  <a:srgbClr val="424242"/>
+                </a:solidFill>
+                <a:effectLst/>
+                <a:latin typeface="Segoe Sans"/>
+              </a:rPr>
+              <a:t>- suppression des prix négatifs ou nuls,</a:t>
+            </a:r>
+            <a:br>
+              <a:rPr lang="fr-FR" sz="2800" b="0" i="0" dirty="0">
+                <a:solidFill>
+                  <a:srgbClr val="424242"/>
+                </a:solidFill>
+                <a:effectLst/>
+                <a:latin typeface="Segoe Sans"/>
+              </a:rPr>
+            </a:br>
+            <a:r>
+              <a:rPr lang="fr-FR" sz="2800" b="0" i="0" dirty="0">
+                <a:solidFill>
+                  <a:srgbClr val="424242"/>
+                </a:solidFill>
+                <a:effectLst/>
+                <a:latin typeface="Segoe Sans"/>
+              </a:rPr>
+              <a:t>- filtrage des bénéfices excessifs (supérieurs à 40%).</a:t>
             </a:r>
             <a:endParaRPr lang="fr-FR" sz="2800" dirty="0"/>
           </a:p>
@@ -3973,20 +4469,46 @@
             <p:ph type="subTitle" idx="1"/>
           </p:nvPr>
         </p:nvSpPr>
-        <p:spPr/>
+        <p:spPr>
+          <a:xfrm>
+            <a:off x="1371600" y="2130425"/>
+            <a:ext cx="6400800" cy="1752600"/>
+          </a:xfrm>
+        </p:spPr>
         <p:txBody>
           <a:bodyPr/>
           <a:lstStyle/>
           <a:p>
             <a:r>
-              <a:rPr lang="fr-FR" dirty="0"/>
+              <a:rPr lang="fr-FR" sz="2800" dirty="0">
+                <a:solidFill>
+                  <a:srgbClr val="424242"/>
+                </a:solidFill>
+                <a:latin typeface="Segoe Sans"/>
+                <a:ea typeface="+mj-ea"/>
+                <a:cs typeface="+mj-cs"/>
+              </a:rPr>
               <a:t>Analyse des résultats de l'algorithme optimisé par rapport aux décisions de </a:t>
             </a:r>
             <a:r>
-              <a:rPr lang="fr-FR" dirty="0" err="1"/>
+              <a:rPr lang="fr-FR" sz="2800" dirty="0" err="1">
+                <a:solidFill>
+                  <a:srgbClr val="424242"/>
+                </a:solidFill>
+                <a:latin typeface="Segoe Sans"/>
+                <a:ea typeface="+mj-ea"/>
+                <a:cs typeface="+mj-cs"/>
+              </a:rPr>
               <a:t>Sienna</a:t>
             </a:r>
-            <a:endParaRPr lang="fr-FR" dirty="0"/>
+            <a:endParaRPr lang="fr-FR" sz="2800" dirty="0">
+              <a:solidFill>
+                <a:srgbClr val="424242"/>
+              </a:solidFill>
+              <a:latin typeface="Segoe Sans"/>
+              <a:ea typeface="+mj-ea"/>
+              <a:cs typeface="+mj-cs"/>
+            </a:endParaRPr>
           </a:p>
         </p:txBody>
       </p:sp>
@@ -4036,7 +4558,7 @@
           <a:p>
             <a:r>
               <a:rPr lang="fr-FR" dirty="0"/>
-              <a:t>Comparaison des Algorithmes d'Investissement</a:t>
+              <a:t>🧭Comparaison des Algorithmes</a:t>
             </a:r>
           </a:p>
         </p:txBody>
@@ -4085,20 +4607,20 @@
         <p:spPr/>
         <p:txBody>
           <a:bodyPr>
-            <a:normAutofit fontScale="90000"/>
+            <a:normAutofit/>
           </a:bodyPr>
           <a:lstStyle/>
           <a:p>
             <a:r>
-              <a:rPr lang="fr-FR" dirty="0"/>
+              <a:rPr lang="fr-FR" sz="4000" dirty="0"/>
               <a:t>Comparaison des résultats - </a:t>
             </a:r>
             <a:r>
-              <a:rPr lang="fr-FR" dirty="0" err="1"/>
+              <a:rPr lang="fr-FR" sz="4000" dirty="0" err="1"/>
               <a:t>Dataset</a:t>
             </a:r>
             <a:r>
-              <a:rPr lang="fr-FR" dirty="0"/>
+              <a:rPr lang="fr-FR" sz="4000" dirty="0"/>
               <a:t> 1</a:t>
             </a:r>
           </a:p>
@@ -5039,4 +5561,319 @@
   </a:objectDefaults>
   <a:extraClrSchemeLst/>
 </a:theme>
+</file>
+
+<file path=ppt/theme/theme2.xml><?xml version="1.0" encoding="utf-8"?>
+<a:theme xmlns:a="http://schemas.openxmlformats.org/drawingml/2006/main" name="Thème Office">
+  <a:themeElements>
+    <a:clrScheme name="Office">
+      <a:dk1>
+        <a:sysClr val="windowText" lastClr="000000"/>
+      </a:dk1>
+      <a:lt1>
+        <a:sysClr val="window" lastClr="FFFFFF"/>
+      </a:lt1>
+      <a:dk2>
+        <a:srgbClr val="0E2841"/>
+      </a:dk2>
+      <a:lt2>
+        <a:srgbClr val="E8E8E8"/>
+      </a:lt2>
+      <a:accent1>
+        <a:srgbClr val="156082"/>
+      </a:accent1>
+      <a:accent2>
+        <a:srgbClr val="E97132"/>
+      </a:accent2>
+      <a:accent3>
+        <a:srgbClr val="196B24"/>
+      </a:accent3>
+      <a:accent4>
+        <a:srgbClr val="0F9ED5"/>
+      </a:accent4>
+      <a:accent5>
+        <a:srgbClr val="A02B93"/>
+      </a:accent5>
+      <a:accent6>
+        <a:srgbClr val="4EA72E"/>
+      </a:accent6>
+      <a:hlink>
+        <a:srgbClr val="467886"/>
+      </a:hlink>
+      <a:folHlink>
+        <a:srgbClr val="96607D"/>
+      </a:folHlink>
+    </a:clrScheme>
+    <a:fontScheme name="Office">
+      <a:majorFont>
+        <a:latin typeface="Aptos Display" panose="02110004020202020204"/>
+        <a:ea typeface=""/>
+        <a:cs typeface=""/>
+        <a:font script="Jpan" typeface="游ゴシック Light"/>
+        <a:font script="Hang" typeface="맑은 고딕"/>
+        <a:font script="Hans" typeface="等线 Light"/>
+        <a:font script="Hant" typeface="新細明體"/>
+        <a:font script="Arab" typeface="Times New Roman"/>
+        <a:font script="Hebr" typeface="Times New Roman"/>
+        <a:font script="Thai" typeface="Angsana New"/>
+        <a:font script="Ethi" typeface="Nyala"/>
+        <a:font script="Beng" typeface="Vrinda"/>
+        <a:font script="Gujr" typeface="Shruti"/>
+        <a:font script="Khmr" typeface="MoolBoran"/>
+        <a:font script="Knda" typeface="Tunga"/>
+        <a:font script="Guru" typeface="Raavi"/>
+        <a:font script="Cans" typeface="Euphemia"/>
+        <a:font script="Cher" typeface="Plantagenet Cherokee"/>
+        <a:font script="Yiii" typeface="Microsoft Yi Baiti"/>
+        <a:font script="Tibt" typeface="Microsoft Himalaya"/>
+        <a:font script="Thaa" typeface="MV Boli"/>
+        <a:font script="Deva" typeface="Mangal"/>
+        <a:font script="Telu" typeface="Gautami"/>
+        <a:font script="Taml" typeface="Latha"/>
+        <a:font script="Syrc" typeface="Estrangelo Edessa"/>
+        <a:font script="Orya" typeface="Kalinga"/>
+        <a:font script="Mlym" typeface="Kartika"/>
+        <a:font script="Laoo" typeface="DokChampa"/>
+        <a:font script="Sinh" typeface="Iskoola Pota"/>
+        <a:font script="Mong" typeface="Mongolian Baiti"/>
+        <a:font script="Viet" typeface="Times New Roman"/>
+        <a:font script="Uigh" typeface="Microsoft Uighur"/>
+        <a:font script="Geor" typeface="Sylfaen"/>
+        <a:font script="Armn" typeface="Arial"/>
+        <a:font script="Bugi" typeface="Leelawadee UI"/>
+        <a:font script="Bopo" typeface="Microsoft JhengHei"/>
+        <a:font script="Java" typeface="Javanese Text"/>
+        <a:font script="Lisu" typeface="Segoe UI"/>
+        <a:font script="Mymr" typeface="Myanmar Text"/>
+        <a:font script="Nkoo" typeface="Ebrima"/>
+        <a:font script="Olck" typeface="Nirmala UI"/>
+        <a:font script="Osma" typeface="Ebrima"/>
+        <a:font script="Phag" typeface="Phagspa"/>
+        <a:font script="Syrn" typeface="Estrangelo Edessa"/>
+        <a:font script="Syrj" typeface="Estrangelo Edessa"/>
+        <a:font script="Syre" typeface="Estrangelo Edessa"/>
+        <a:font script="Sora" typeface="Nirmala UI"/>
+        <a:font script="Tale" typeface="Microsoft Tai Le"/>
+        <a:font script="Talu" typeface="Microsoft New Tai Lue"/>
+        <a:font script="Tfng" typeface="Ebrima"/>
+      </a:majorFont>
+      <a:minorFont>
+        <a:latin typeface="Aptos" panose="02110004020202020204"/>
+        <a:ea typeface=""/>
+        <a:cs typeface=""/>
+        <a:font script="Jpan" typeface="游ゴシック"/>
+        <a:font script="Hang" typeface="맑은 고딕"/>
+        <a:font script="Hans" typeface="等线"/>
+        <a:font script="Hant" typeface="新細明體"/>
+        <a:font script="Arab" typeface="Arial"/>
+        <a:font script="Hebr" typeface="Arial"/>
+        <a:font script="Thai" typeface="Cordia New"/>
+        <a:font script="Ethi" typeface="Nyala"/>
+        <a:font script="Beng" typeface="Vrinda"/>
+        <a:font script="Gujr" typeface="Shruti"/>
+        <a:font script="Khmr" typeface="DaunPenh"/>
+        <a:font script="Knda" typeface="Tunga"/>
+        <a:font script="Guru" typeface="Raavi"/>
+        <a:font script="Cans" typeface="Euphemia"/>
+        <a:font script="Cher" typeface="Plantagenet Cherokee"/>
+        <a:font script="Yiii" typeface="Microsoft Yi Baiti"/>
+        <a:font script="Tibt" typeface="Microsoft Himalaya"/>
+        <a:font script="Thaa" typeface="MV Boli"/>
+        <a:font script="Deva" typeface="Mangal"/>
+        <a:font script="Telu" typeface="Gautami"/>
+        <a:font script="Taml" typeface="Latha"/>
+        <a:font script="Syrc" typeface="Estrangelo Edessa"/>
+        <a:font script="Orya" typeface="Kalinga"/>
+        <a:font script="Mlym" typeface="Kartika"/>
+        <a:font script="Laoo" typeface="DokChampa"/>
+        <a:font script="Sinh" typeface="Iskoola Pota"/>
+        <a:font script="Mong" typeface="Mongolian Baiti"/>
+        <a:font script="Viet" typeface="Arial"/>
+        <a:font script="Uigh" typeface="Microsoft Uighur"/>
+        <a:font script="Geor" typeface="Sylfaen"/>
+        <a:font script="Armn" typeface="Arial"/>
+        <a:font script="Bugi" typeface="Leelawadee UI"/>
+        <a:font script="Bopo" typeface="Microsoft JhengHei"/>
+        <a:font script="Java" typeface="Javanese Text"/>
+        <a:font script="Lisu" typeface="Segoe UI"/>
+        <a:font script="Mymr" typeface="Myanmar Text"/>
+        <a:font script="Nkoo" typeface="Ebrima"/>
+        <a:font script="Olck" typeface="Nirmala UI"/>
+        <a:font script="Osma" typeface="Ebrima"/>
+        <a:font script="Phag" typeface="Phagspa"/>
+        <a:font script="Syrn" typeface="Estrangelo Edessa"/>
+        <a:font script="Syrj" typeface="Estrangelo Edessa"/>
+        <a:font script="Syre" typeface="Estrangelo Edessa"/>
+        <a:font script="Sora" typeface="Nirmala UI"/>
+        <a:font script="Tale" typeface="Microsoft Tai Le"/>
+        <a:font script="Talu" typeface="Microsoft New Tai Lue"/>
+        <a:font script="Tfng" typeface="Ebrima"/>
+      </a:minorFont>
+    </a:fontScheme>
+    <a:fmtScheme name="Office">
+      <a:fillStyleLst>
+        <a:solidFill>
+          <a:schemeClr val="phClr"/>
+        </a:solidFill>
+        <a:gradFill rotWithShape="1">
+          <a:gsLst>
+            <a:gs pos="0">
+              <a:schemeClr val="phClr">
+                <a:lumMod val="110000"/>
+                <a:satMod val="105000"/>
+                <a:tint val="67000"/>
+              </a:schemeClr>
+            </a:gs>
+            <a:gs pos="50000">
+              <a:schemeClr val="phClr">
+                <a:lumMod val="105000"/>
+                <a:satMod val="103000"/>
+                <a:tint val="73000"/>
+              </a:schemeClr>
+            </a:gs>
+            <a:gs pos="100000">
+              <a:schemeClr val="phClr">
+                <a:lumMod val="105000"/>
+                <a:satMod val="109000"/>
+                <a:tint val="81000"/>
+              </a:schemeClr>
+            </a:gs>
+          </a:gsLst>
+          <a:lin ang="5400000" scaled="0"/>
+        </a:gradFill>
+        <a:gradFill rotWithShape="1">
+          <a:gsLst>
+            <a:gs pos="0">
+              <a:schemeClr val="phClr">
+                <a:satMod val="103000"/>
+                <a:lumMod val="102000"/>
+                <a:tint val="94000"/>
+              </a:schemeClr>
+            </a:gs>
+            <a:gs pos="50000">
+              <a:schemeClr val="phClr">
+                <a:satMod val="110000"/>
+                <a:lumMod val="100000"/>
+                <a:shade val="100000"/>
+              </a:schemeClr>
+            </a:gs>
+            <a:gs pos="100000">
+              <a:schemeClr val="phClr">
+                <a:lumMod val="99000"/>
+                <a:satMod val="120000"/>
+                <a:shade val="78000"/>
+              </a:schemeClr>
+            </a:gs>
+          </a:gsLst>
+          <a:lin ang="5400000" scaled="0"/>
+        </a:gradFill>
+      </a:fillStyleLst>
+      <a:lnStyleLst>
+        <a:ln w="12700" cap="flat" cmpd="sng" algn="ctr">
+          <a:solidFill>
+            <a:schemeClr val="phClr"/>
+          </a:solidFill>
+          <a:prstDash val="solid"/>
+          <a:miter lim="800000"/>
+        </a:ln>
+        <a:ln w="19050" cap="flat" cmpd="sng" algn="ctr">
+          <a:solidFill>
+            <a:schemeClr val="phClr"/>
+          </a:solidFill>
+          <a:prstDash val="solid"/>
+          <a:miter lim="800000"/>
+        </a:ln>
+        <a:ln w="25400" cap="flat" cmpd="sng" algn="ctr">
+          <a:solidFill>
+            <a:schemeClr val="phClr"/>
+          </a:solidFill>
+          <a:prstDash val="solid"/>
+          <a:miter lim="800000"/>
+        </a:ln>
+      </a:lnStyleLst>
+      <a:effectStyleLst>
+        <a:effectStyle>
+          <a:effectLst/>
+        </a:effectStyle>
+        <a:effectStyle>
+          <a:effectLst/>
+        </a:effectStyle>
+        <a:effectStyle>
+          <a:effectLst>
+            <a:outerShdw blurRad="57150" dist="19050" dir="5400000" algn="ctr" rotWithShape="0">
+              <a:srgbClr val="000000">
+                <a:alpha val="63000"/>
+              </a:srgbClr>
+            </a:outerShdw>
+          </a:effectLst>
+        </a:effectStyle>
+      </a:effectStyleLst>
+      <a:bgFillStyleLst>
+        <a:solidFill>
+          <a:schemeClr val="phClr"/>
+        </a:solidFill>
+        <a:solidFill>
+          <a:schemeClr val="phClr">
+            <a:tint val="95000"/>
+            <a:satMod val="170000"/>
+          </a:schemeClr>
+        </a:solidFill>
+        <a:gradFill rotWithShape="1">
+          <a:gsLst>
+            <a:gs pos="0">
+              <a:schemeClr val="phClr">
+                <a:tint val="93000"/>
+                <a:satMod val="150000"/>
+                <a:shade val="98000"/>
+                <a:lumMod val="102000"/>
+              </a:schemeClr>
+            </a:gs>
+            <a:gs pos="50000">
+              <a:schemeClr val="phClr">
+                <a:tint val="98000"/>
+                <a:satMod val="130000"/>
+                <a:shade val="90000"/>
+                <a:lumMod val="103000"/>
+              </a:schemeClr>
+            </a:gs>
+            <a:gs pos="100000">
+              <a:schemeClr val="phClr">
+                <a:shade val="63000"/>
+                <a:satMod val="120000"/>
+              </a:schemeClr>
+            </a:gs>
+          </a:gsLst>
+          <a:lin ang="5400000" scaled="0"/>
+        </a:gradFill>
+      </a:bgFillStyleLst>
+    </a:fmtScheme>
+  </a:themeElements>
+  <a:objectDefaults>
+    <a:lnDef>
+      <a:spPr/>
+      <a:bodyPr/>
+      <a:lstStyle/>
+      <a:style>
+        <a:lnRef idx="2">
+          <a:schemeClr val="accent1"/>
+        </a:lnRef>
+        <a:fillRef idx="0">
+          <a:schemeClr val="accent1"/>
+        </a:fillRef>
+        <a:effectRef idx="1">
+          <a:schemeClr val="accent1"/>
+        </a:effectRef>
+        <a:fontRef idx="minor">
+          <a:schemeClr val="tx1"/>
+        </a:fontRef>
+      </a:style>
+    </a:lnDef>
+  </a:objectDefaults>
+  <a:extraClrSchemeLst/>
+  <a:extLst>
+    <a:ext uri="{05A4C25C-085E-4340-85A3-A5531E510DB2}">
+      <thm15:themeFamily xmlns:thm15="http://schemas.microsoft.com/office/thememl/2012/main" name="Office Theme" id="{2E142A2C-CD16-42D6-873A-C26D2A0506FA}" vid="{1BDDFF52-6CD6-40A5-AB3C-68EB2F1E4D0A}"/>
+    </a:ext>
+  </a:extLst>
+</a:theme>
 </file>
</xml_diff>

<commit_message>
Corrige l'algorithme du sac à dos
</commit_message>
<xml_diff>
--- a/doc/Comparaison_Algorithmes.pptx
+++ b/doc/Comparaison_Algorithmes.pptx
@@ -5,7 +5,7 @@
     <p:sldMasterId id="2147483648" r:id="rId1"/>
   </p:sldMasterIdLst>
   <p:notesMasterIdLst>
-    <p:notesMasterId r:id="rId9"/>
+    <p:notesMasterId r:id="rId10"/>
   </p:notesMasterIdLst>
   <p:sldIdLst>
     <p:sldId id="256" r:id="rId2"/>
@@ -15,6 +15,7 @@
     <p:sldId id="260" r:id="rId6"/>
     <p:sldId id="261" r:id="rId7"/>
     <p:sldId id="262" r:id="rId8"/>
+    <p:sldId id="263" r:id="rId9"/>
   </p:sldIdLst>
   <p:sldSz cx="9144000" cy="6858000" type="screen4x3"/>
   <p:notesSz cx="6858000" cy="9144000"/>
@@ -4382,8 +4383,8 @@
         </p:nvSpPr>
         <p:spPr>
           <a:xfrm>
-            <a:off x="685800" y="4398137"/>
-            <a:ext cx="7772400" cy="1470025"/>
+            <a:off x="685800" y="4270248"/>
+            <a:ext cx="7772400" cy="1597914"/>
           </a:xfrm>
         </p:spPr>
         <p:style>
@@ -4402,7 +4403,7 @@
         </p:style>
         <p:txBody>
           <a:bodyPr>
-            <a:normAutofit fontScale="90000"/>
+            <a:normAutofit/>
           </a:bodyPr>
           <a:lstStyle/>
           <a:p>
@@ -4415,47 +4416,46 @@
                 <a:effectLst/>
                 <a:latin typeface="Segoe Sans"/>
               </a:rPr>
-              <a:t>ℹ️ Les deux fichiers csv ont été nettoyés :</a:t>
+              <a:t>ℹ️ </a:t>
+            </a:r>
+            <a:r>
+              <a:rPr lang="fr-FR" sz="2800" dirty="0">
+                <a:solidFill>
+                  <a:schemeClr val="tx1"/>
+                </a:solidFill>
+              </a:rPr>
+              <a:t>Les deux fichiers csv ont été nettoyés :</a:t>
             </a:r>
             <a:br>
-              <a:rPr lang="fr-FR" sz="2800" b="0" i="0" dirty="0">
+              <a:rPr lang="fr-FR" sz="2800" dirty="0">
                 <a:solidFill>
-                  <a:srgbClr val="424242"/>
+                  <a:schemeClr val="tx1"/>
                 </a:solidFill>
-                <a:effectLst/>
-                <a:latin typeface="Segoe Sans"/>
               </a:rPr>
             </a:br>
             <a:r>
-              <a:rPr lang="fr-FR" sz="2800" b="0" i="0" dirty="0">
+              <a:rPr lang="fr-FR" sz="2800" dirty="0">
                 <a:solidFill>
-                  <a:srgbClr val="424242"/>
+                  <a:schemeClr val="tx1"/>
                 </a:solidFill>
-                <a:effectLst/>
-                <a:latin typeface="Segoe Sans"/>
               </a:rPr>
               <a:t>- suppression des prix négatifs ou nuls,</a:t>
             </a:r>
             <a:br>
-              <a:rPr lang="fr-FR" sz="2800" b="0" i="0" dirty="0">
+              <a:rPr lang="fr-FR" sz="2800" dirty="0">
                 <a:solidFill>
-                  <a:srgbClr val="424242"/>
+                  <a:schemeClr val="tx1"/>
                 </a:solidFill>
-                <a:effectLst/>
-                <a:latin typeface="Segoe Sans"/>
               </a:rPr>
             </a:br>
             <a:r>
-              <a:rPr lang="fr-FR" sz="2800" b="0" i="0" dirty="0">
+              <a:rPr lang="fr-FR" sz="2800" dirty="0">
                 <a:solidFill>
-                  <a:srgbClr val="424242"/>
+                  <a:schemeClr val="tx1"/>
                 </a:solidFill>
-                <a:effectLst/>
-                <a:latin typeface="Segoe Sans"/>
               </a:rPr>
               <a:t>- filtrage des bénéfices excessifs (supérieurs à 40%).</a:t>
             </a:r>
-            <a:endParaRPr lang="fr-FR" sz="2800" dirty="0"/>
           </a:p>
         </p:txBody>
       </p:sp>
@@ -5234,6 +5234,91 @@
     <p:extLst>
       <p:ext uri="{BB962C8B-B14F-4D97-AF65-F5344CB8AC3E}">
         <p14:creationId xmlns:p14="http://schemas.microsoft.com/office/powerpoint/2010/main" val="1578324690"/>
+      </p:ext>
+    </p:extLst>
+  </p:cSld>
+  <p:clrMapOvr>
+    <a:masterClrMapping/>
+  </p:clrMapOvr>
+</p:sld>
+</file>
+
+<file path=ppt/slides/slide8.xml><?xml version="1.0" encoding="utf-8"?>
+<p:sld xmlns:a="http://schemas.openxmlformats.org/drawingml/2006/main" xmlns:r="http://schemas.openxmlformats.org/officeDocument/2006/relationships" xmlns:p="http://schemas.openxmlformats.org/presentationml/2006/main">
+  <p:cSld>
+    <p:spTree>
+      <p:nvGrpSpPr>
+        <p:cNvPr id="1" name=""/>
+        <p:cNvGrpSpPr/>
+        <p:nvPr/>
+      </p:nvGrpSpPr>
+      <p:grpSpPr>
+        <a:xfrm>
+          <a:off x="0" y="0"/>
+          <a:ext cx="0" cy="0"/>
+          <a:chOff x="0" y="0"/>
+          <a:chExt cx="0" cy="0"/>
+        </a:xfrm>
+      </p:grpSpPr>
+      <p:sp>
+        <p:nvSpPr>
+          <p:cNvPr id="2" name="Titre 1">
+            <a:extLst>
+              <a:ext uri="{FF2B5EF4-FFF2-40B4-BE49-F238E27FC236}">
+                <a16:creationId xmlns:a16="http://schemas.microsoft.com/office/drawing/2014/main" id="{184D5F92-16E5-4B8D-8F98-D0F03C438EA8}"/>
+              </a:ext>
+            </a:extLst>
+          </p:cNvPr>
+          <p:cNvSpPr>
+            <a:spLocks noGrp="1"/>
+          </p:cNvSpPr>
+          <p:nvPr>
+            <p:ph type="title"/>
+          </p:nvPr>
+        </p:nvSpPr>
+        <p:spPr/>
+        <p:txBody>
+          <a:bodyPr>
+            <a:normAutofit fontScale="90000"/>
+          </a:bodyPr>
+          <a:lstStyle/>
+          <a:p>
+            <a:r>
+              <a:rPr lang="fr-FR" dirty="0"/>
+              <a:t>Rapport d'exploration de l'ensemble des données</a:t>
+            </a:r>
+          </a:p>
+        </p:txBody>
+      </p:sp>
+      <p:sp>
+        <p:nvSpPr>
+          <p:cNvPr id="3" name="Espace réservé du contenu 2">
+            <a:extLst>
+              <a:ext uri="{FF2B5EF4-FFF2-40B4-BE49-F238E27FC236}">
+                <a16:creationId xmlns:a16="http://schemas.microsoft.com/office/drawing/2014/main" id="{B38FC449-1024-4415-33CD-C0F8671CC51C}"/>
+              </a:ext>
+            </a:extLst>
+          </p:cNvPr>
+          <p:cNvSpPr>
+            <a:spLocks noGrp="1"/>
+          </p:cNvSpPr>
+          <p:nvPr>
+            <p:ph idx="1"/>
+          </p:nvPr>
+        </p:nvSpPr>
+        <p:spPr/>
+        <p:txBody>
+          <a:bodyPr/>
+          <a:lstStyle/>
+          <a:p>
+            <a:endParaRPr lang="fr-FR"/>
+          </a:p>
+        </p:txBody>
+      </p:sp>
+    </p:spTree>
+    <p:extLst>
+      <p:ext uri="{BB962C8B-B14F-4D97-AF65-F5344CB8AC3E}">
+        <p14:creationId xmlns:p14="http://schemas.microsoft.com/office/powerpoint/2010/main" val="1315553961"/>
       </p:ext>
     </p:extLst>
   </p:cSld>

</xml_diff>

<commit_message>
Ajoute une fonction pour afficher un aperçu du DataFrame dans le script d'optimisation
</commit_message>
<xml_diff>
--- a/doc/Comparaison_Algorithmes.pptx
+++ b/doc/Comparaison_Algorithmes.pptx
@@ -5308,10 +5308,369 @@
         </p:nvSpPr>
         <p:spPr/>
         <p:txBody>
-          <a:bodyPr/>
+          <a:bodyPr>
+            <a:normAutofit fontScale="25000" lnSpcReduction="20000"/>
+          </a:bodyPr>
           <a:lstStyle/>
           <a:p>
-            <a:endParaRPr lang="fr-FR"/>
+            <a:r>
+              <a:rPr lang="fr-FR"/>
+              <a:t>Ensemble </a:t>
+            </a:r>
+            <a:r>
+              <a:rPr lang="fr-FR" dirty="0"/>
+              <a:t>de Données 1</a:t>
+            </a:r>
+          </a:p>
+          <a:p>
+            <a:r>
+              <a:rPr lang="fr-FR" dirty="0"/>
+              <a:t>Aperçu des données :</a:t>
+            </a:r>
+          </a:p>
+          <a:p>
+            <a:endParaRPr lang="fr-FR" dirty="0"/>
+          </a:p>
+          <a:p>
+            <a:r>
+              <a:rPr lang="fr-FR" dirty="0"/>
+              <a:t>Nombre d'entrées : 1001</a:t>
+            </a:r>
+          </a:p>
+          <a:p>
+            <a:r>
+              <a:rPr lang="fr-FR" dirty="0"/>
+              <a:t>Colonnes : </a:t>
+            </a:r>
+            <a:r>
+              <a:rPr lang="fr-FR" dirty="0" err="1"/>
+              <a:t>name</a:t>
+            </a:r>
+            <a:r>
+              <a:rPr lang="fr-FR" dirty="0"/>
+              <a:t>, </a:t>
+            </a:r>
+            <a:r>
+              <a:rPr lang="fr-FR" dirty="0" err="1"/>
+              <a:t>price</a:t>
+            </a:r>
+            <a:r>
+              <a:rPr lang="fr-FR" dirty="0"/>
+              <a:t>, profit</a:t>
+            </a:r>
+          </a:p>
+          <a:p>
+            <a:r>
+              <a:rPr lang="fr-FR" dirty="0"/>
+              <a:t>Types de données : </a:t>
+            </a:r>
+            <a:r>
+              <a:rPr lang="fr-FR" dirty="0" err="1"/>
+              <a:t>name</a:t>
+            </a:r>
+            <a:r>
+              <a:rPr lang="fr-FR" dirty="0"/>
+              <a:t> (</a:t>
+            </a:r>
+            <a:r>
+              <a:rPr lang="fr-FR" dirty="0" err="1"/>
+              <a:t>object</a:t>
+            </a:r>
+            <a:r>
+              <a:rPr lang="fr-FR" dirty="0"/>
+              <a:t>), </a:t>
+            </a:r>
+            <a:r>
+              <a:rPr lang="fr-FR" dirty="0" err="1"/>
+              <a:t>price</a:t>
+            </a:r>
+            <a:r>
+              <a:rPr lang="fr-FR" dirty="0"/>
+              <a:t> (float64), profit (float64)</a:t>
+            </a:r>
+          </a:p>
+          <a:p>
+            <a:r>
+              <a:rPr lang="fr-FR" dirty="0"/>
+              <a:t>Statistiques descriptives :</a:t>
+            </a:r>
+          </a:p>
+          <a:p>
+            <a:endParaRPr lang="fr-FR" dirty="0"/>
+          </a:p>
+          <a:p>
+            <a:r>
+              <a:rPr lang="fr-FR" dirty="0"/>
+              <a:t>Prix :</a:t>
+            </a:r>
+          </a:p>
+          <a:p>
+            <a:r>
+              <a:rPr lang="fr-FR" dirty="0"/>
+              <a:t>Moyenne : 24.41</a:t>
+            </a:r>
+          </a:p>
+          <a:p>
+            <a:r>
+              <a:rPr lang="fr-FR" dirty="0"/>
+              <a:t>Écart-type : 19.65</a:t>
+            </a:r>
+          </a:p>
+          <a:p>
+            <a:r>
+              <a:rPr lang="fr-FR" dirty="0"/>
+              <a:t>Minimum : -2.73</a:t>
+            </a:r>
+          </a:p>
+          <a:p>
+            <a:r>
+              <a:rPr lang="fr-FR" dirty="0"/>
+              <a:t>25% : 15.17</a:t>
+            </a:r>
+          </a:p>
+          <a:p>
+            <a:r>
+              <a:rPr lang="fr-FR" dirty="0"/>
+              <a:t>Médiane : 24.87</a:t>
+            </a:r>
+          </a:p>
+          <a:p>
+            <a:r>
+              <a:rPr lang="fr-FR" dirty="0"/>
+              <a:t>75% : 33.55</a:t>
+            </a:r>
+          </a:p>
+          <a:p>
+            <a:r>
+              <a:rPr lang="fr-FR" dirty="0"/>
+              <a:t>Maximum : 498.76</a:t>
+            </a:r>
+          </a:p>
+          <a:p>
+            <a:r>
+              <a:rPr lang="fr-FR" dirty="0"/>
+              <a:t>Profit :</a:t>
+            </a:r>
+          </a:p>
+          <a:p>
+            <a:r>
+              <a:rPr lang="fr-FR" dirty="0"/>
+              <a:t>Moyenne : 20.33</a:t>
+            </a:r>
+          </a:p>
+          <a:p>
+            <a:r>
+              <a:rPr lang="fr-FR" dirty="0"/>
+              <a:t>Écart-type : 11.44</a:t>
+            </a:r>
+          </a:p>
+          <a:p>
+            <a:r>
+              <a:rPr lang="fr-FR" dirty="0"/>
+              <a:t>Minimum : 0.00</a:t>
+            </a:r>
+          </a:p>
+          <a:p>
+            <a:r>
+              <a:rPr lang="fr-FR" dirty="0"/>
+              <a:t>25% : 10.87</a:t>
+            </a:r>
+          </a:p>
+          <a:p>
+            <a:r>
+              <a:rPr lang="fr-FR" dirty="0"/>
+              <a:t>Médiane : 20.07</a:t>
+            </a:r>
+          </a:p>
+          <a:p>
+            <a:r>
+              <a:rPr lang="fr-FR" dirty="0"/>
+              <a:t>75% : 30.68</a:t>
+            </a:r>
+          </a:p>
+          <a:p>
+            <a:r>
+              <a:rPr lang="fr-FR" dirty="0"/>
+              <a:t>Maximum : 39.98</a:t>
+            </a:r>
+          </a:p>
+          <a:p>
+            <a:r>
+              <a:rPr lang="fr-FR" dirty="0"/>
+              <a:t>Ensemble de Données 2</a:t>
+            </a:r>
+          </a:p>
+          <a:p>
+            <a:r>
+              <a:rPr lang="fr-FR" dirty="0"/>
+              <a:t>Aperçu des données :</a:t>
+            </a:r>
+          </a:p>
+          <a:p>
+            <a:endParaRPr lang="fr-FR" dirty="0"/>
+          </a:p>
+          <a:p>
+            <a:r>
+              <a:rPr lang="fr-FR" dirty="0"/>
+              <a:t>Nombre d'entrées : 1000</a:t>
+            </a:r>
+          </a:p>
+          <a:p>
+            <a:r>
+              <a:rPr lang="fr-FR" dirty="0"/>
+              <a:t>Colonnes : </a:t>
+            </a:r>
+            <a:r>
+              <a:rPr lang="fr-FR" dirty="0" err="1"/>
+              <a:t>name</a:t>
+            </a:r>
+            <a:r>
+              <a:rPr lang="fr-FR" dirty="0"/>
+              <a:t>, </a:t>
+            </a:r>
+            <a:r>
+              <a:rPr lang="fr-FR" dirty="0" err="1"/>
+              <a:t>price</a:t>
+            </a:r>
+            <a:r>
+              <a:rPr lang="fr-FR" dirty="0"/>
+              <a:t>, profit</a:t>
+            </a:r>
+          </a:p>
+          <a:p>
+            <a:r>
+              <a:rPr lang="fr-FR" dirty="0"/>
+              <a:t>Types de données : </a:t>
+            </a:r>
+            <a:r>
+              <a:rPr lang="fr-FR" dirty="0" err="1"/>
+              <a:t>name</a:t>
+            </a:r>
+            <a:r>
+              <a:rPr lang="fr-FR" dirty="0"/>
+              <a:t> (</a:t>
+            </a:r>
+            <a:r>
+              <a:rPr lang="fr-FR" dirty="0" err="1"/>
+              <a:t>object</a:t>
+            </a:r>
+            <a:r>
+              <a:rPr lang="fr-FR" dirty="0"/>
+              <a:t>), </a:t>
+            </a:r>
+            <a:r>
+              <a:rPr lang="fr-FR" dirty="0" err="1"/>
+              <a:t>price</a:t>
+            </a:r>
+            <a:r>
+              <a:rPr lang="fr-FR" dirty="0"/>
+              <a:t> (float64), profit (float64)</a:t>
+            </a:r>
+          </a:p>
+          <a:p>
+            <a:r>
+              <a:rPr lang="fr-FR" dirty="0"/>
+              <a:t>Statistiques descriptives :</a:t>
+            </a:r>
+          </a:p>
+          <a:p>
+            <a:endParaRPr lang="fr-FR" dirty="0"/>
+          </a:p>
+          <a:p>
+            <a:r>
+              <a:rPr lang="fr-FR" dirty="0"/>
+              <a:t>Prix :</a:t>
+            </a:r>
+          </a:p>
+          <a:p>
+            <a:r>
+              <a:rPr lang="fr-FR" dirty="0"/>
+              <a:t>Moyenne : 12.61</a:t>
+            </a:r>
+          </a:p>
+          <a:p>
+            <a:r>
+              <a:rPr lang="fr-FR" dirty="0"/>
+              <a:t>Écart-type : 16.24</a:t>
+            </a:r>
+          </a:p>
+          <a:p>
+            <a:r>
+              <a:rPr lang="fr-FR" dirty="0"/>
+              <a:t>Minimum : -9.95</a:t>
+            </a:r>
+          </a:p>
+          <a:p>
+            <a:r>
+              <a:rPr lang="fr-FR" dirty="0"/>
+              <a:t>25% : 0.00</a:t>
+            </a:r>
+          </a:p>
+          <a:p>
+            <a:r>
+              <a:rPr lang="fr-FR" dirty="0"/>
+              <a:t>Médiane : 9.37</a:t>
+            </a:r>
+          </a:p>
+          <a:p>
+            <a:r>
+              <a:rPr lang="fr-FR" dirty="0"/>
+              <a:t>75% : 27.16</a:t>
+            </a:r>
+          </a:p>
+          <a:p>
+            <a:r>
+              <a:rPr lang="fr-FR" dirty="0"/>
+              <a:t>Maximum : 51.46</a:t>
+            </a:r>
+          </a:p>
+          <a:p>
+            <a:r>
+              <a:rPr lang="fr-FR" dirty="0"/>
+              <a:t>Profit :</a:t>
+            </a:r>
+          </a:p>
+          <a:p>
+            <a:r>
+              <a:rPr lang="fr-FR" dirty="0"/>
+              <a:t>Moyenne : 19.66</a:t>
+            </a:r>
+          </a:p>
+          <a:p>
+            <a:r>
+              <a:rPr lang="fr-FR" dirty="0"/>
+              <a:t>Écart-type : 11.92</a:t>
+            </a:r>
+          </a:p>
+          <a:p>
+            <a:r>
+              <a:rPr lang="fr-FR" dirty="0"/>
+              <a:t>Minimum : 0.15</a:t>
+            </a:r>
+          </a:p>
+          <a:p>
+            <a:r>
+              <a:rPr lang="fr-FR" dirty="0"/>
+              <a:t>25% : 8.98</a:t>
+            </a:r>
+          </a:p>
+          <a:p>
+            <a:r>
+              <a:rPr lang="fr-FR" dirty="0"/>
+              <a:t>Médiane : 19.81</a:t>
+            </a:r>
+          </a:p>
+          <a:p>
+            <a:r>
+              <a:rPr lang="fr-FR" dirty="0"/>
+              <a:t>75% : 30.57</a:t>
+            </a:r>
+          </a:p>
+          <a:p>
+            <a:r>
+              <a:rPr lang="fr-FR" dirty="0"/>
+              <a:t>Maximum : 39.98</a:t>
+            </a:r>
           </a:p>
         </p:txBody>
       </p:sp>

</xml_diff>

<commit_message>
Ajoute un rapport d'exploration des données dans Comparaison_Algorithmes
</commit_message>
<xml_diff>
--- a/doc/Comparaison_Algorithmes.pptx
+++ b/doc/Comparaison_Algorithmes.pptx
@@ -5,7 +5,7 @@
     <p:sldMasterId id="2147483648" r:id="rId1"/>
   </p:sldMasterIdLst>
   <p:notesMasterIdLst>
-    <p:notesMasterId r:id="rId10"/>
+    <p:notesMasterId r:id="rId11"/>
   </p:notesMasterIdLst>
   <p:sldIdLst>
     <p:sldId id="256" r:id="rId2"/>
@@ -16,6 +16,7 @@
     <p:sldId id="261" r:id="rId7"/>
     <p:sldId id="262" r:id="rId8"/>
     <p:sldId id="263" r:id="rId9"/>
+    <p:sldId id="264" r:id="rId10"/>
   </p:sldIdLst>
   <p:sldSz cx="9144000" cy="6858000" type="screen4x3"/>
   <p:notesSz cx="6858000" cy="9144000"/>
@@ -5290,394 +5291,608 @@
           </a:p>
         </p:txBody>
       </p:sp>
-      <p:sp>
-        <p:nvSpPr>
-          <p:cNvPr id="3" name="Espace réservé du contenu 2">
+      <p:graphicFrame>
+        <p:nvGraphicFramePr>
+          <p:cNvPr id="4" name="Espace réservé du contenu 3">
             <a:extLst>
               <a:ext uri="{FF2B5EF4-FFF2-40B4-BE49-F238E27FC236}">
-                <a16:creationId xmlns:a16="http://schemas.microsoft.com/office/drawing/2014/main" id="{B38FC449-1024-4415-33CD-C0F8671CC51C}"/>
+                <a16:creationId xmlns:a16="http://schemas.microsoft.com/office/drawing/2014/main" id="{E2430FE2-BFA9-413D-7AAB-D2918A39EDF0}"/>
               </a:ext>
             </a:extLst>
           </p:cNvPr>
-          <p:cNvSpPr>
-            <a:spLocks noGrp="1"/>
-          </p:cNvSpPr>
+          <p:cNvGraphicFramePr>
+            <a:graphicFrameLocks noGrp="1"/>
+          </p:cNvGraphicFramePr>
           <p:nvPr>
             <p:ph idx="1"/>
-          </p:nvPr>
-        </p:nvSpPr>
-        <p:spPr/>
-        <p:txBody>
-          <a:bodyPr>
-            <a:normAutofit fontScale="25000" lnSpcReduction="20000"/>
-          </a:bodyPr>
-          <a:lstStyle/>
-          <a:p>
-            <a:r>
-              <a:rPr lang="fr-FR"/>
-              <a:t>Ensemble </a:t>
-            </a:r>
-            <a:r>
-              <a:rPr lang="fr-FR" dirty="0"/>
-              <a:t>de Données 1</a:t>
-            </a:r>
-          </a:p>
-          <a:p>
-            <a:r>
-              <a:rPr lang="fr-FR" dirty="0"/>
-              <a:t>Aperçu des données :</a:t>
-            </a:r>
-          </a:p>
-          <a:p>
-            <a:endParaRPr lang="fr-FR" dirty="0"/>
-          </a:p>
-          <a:p>
-            <a:r>
-              <a:rPr lang="fr-FR" dirty="0"/>
-              <a:t>Nombre d'entrées : 1001</a:t>
-            </a:r>
-          </a:p>
-          <a:p>
-            <a:r>
-              <a:rPr lang="fr-FR" dirty="0"/>
-              <a:t>Colonnes : </a:t>
-            </a:r>
-            <a:r>
-              <a:rPr lang="fr-FR" dirty="0" err="1"/>
-              <a:t>name</a:t>
-            </a:r>
-            <a:r>
-              <a:rPr lang="fr-FR" dirty="0"/>
-              <a:t>, </a:t>
-            </a:r>
-            <a:r>
-              <a:rPr lang="fr-FR" dirty="0" err="1"/>
-              <a:t>price</a:t>
-            </a:r>
-            <a:r>
-              <a:rPr lang="fr-FR" dirty="0"/>
-              <a:t>, profit</a:t>
-            </a:r>
-          </a:p>
-          <a:p>
-            <a:r>
-              <a:rPr lang="fr-FR" dirty="0"/>
-              <a:t>Types de données : </a:t>
-            </a:r>
-            <a:r>
-              <a:rPr lang="fr-FR" dirty="0" err="1"/>
-              <a:t>name</a:t>
-            </a:r>
-            <a:r>
-              <a:rPr lang="fr-FR" dirty="0"/>
-              <a:t> (</a:t>
-            </a:r>
-            <a:r>
-              <a:rPr lang="fr-FR" dirty="0" err="1"/>
-              <a:t>object</a:t>
-            </a:r>
-            <a:r>
-              <a:rPr lang="fr-FR" dirty="0"/>
-              <a:t>), </a:t>
-            </a:r>
-            <a:r>
-              <a:rPr lang="fr-FR" dirty="0" err="1"/>
-              <a:t>price</a:t>
-            </a:r>
-            <a:r>
-              <a:rPr lang="fr-FR" dirty="0"/>
-              <a:t> (float64), profit (float64)</a:t>
-            </a:r>
-          </a:p>
-          <a:p>
-            <a:r>
-              <a:rPr lang="fr-FR" dirty="0"/>
-              <a:t>Statistiques descriptives :</a:t>
-            </a:r>
-          </a:p>
-          <a:p>
-            <a:endParaRPr lang="fr-FR" dirty="0"/>
-          </a:p>
-          <a:p>
-            <a:r>
-              <a:rPr lang="fr-FR" dirty="0"/>
-              <a:t>Prix :</a:t>
-            </a:r>
-          </a:p>
-          <a:p>
-            <a:r>
-              <a:rPr lang="fr-FR" dirty="0"/>
-              <a:t>Moyenne : 24.41</a:t>
-            </a:r>
-          </a:p>
-          <a:p>
-            <a:r>
-              <a:rPr lang="fr-FR" dirty="0"/>
-              <a:t>Écart-type : 19.65</a:t>
-            </a:r>
-          </a:p>
-          <a:p>
-            <a:r>
-              <a:rPr lang="fr-FR" dirty="0"/>
-              <a:t>Minimum : -2.73</a:t>
-            </a:r>
-          </a:p>
-          <a:p>
-            <a:r>
-              <a:rPr lang="fr-FR" dirty="0"/>
-              <a:t>25% : 15.17</a:t>
-            </a:r>
-          </a:p>
-          <a:p>
-            <a:r>
-              <a:rPr lang="fr-FR" dirty="0"/>
-              <a:t>Médiane : 24.87</a:t>
-            </a:r>
-          </a:p>
-          <a:p>
-            <a:r>
-              <a:rPr lang="fr-FR" dirty="0"/>
-              <a:t>75% : 33.55</a:t>
-            </a:r>
-          </a:p>
-          <a:p>
-            <a:r>
-              <a:rPr lang="fr-FR" dirty="0"/>
-              <a:t>Maximum : 498.76</a:t>
-            </a:r>
-          </a:p>
-          <a:p>
-            <a:r>
-              <a:rPr lang="fr-FR" dirty="0"/>
-              <a:t>Profit :</a:t>
-            </a:r>
-          </a:p>
-          <a:p>
-            <a:r>
-              <a:rPr lang="fr-FR" dirty="0"/>
-              <a:t>Moyenne : 20.33</a:t>
-            </a:r>
-          </a:p>
-          <a:p>
-            <a:r>
-              <a:rPr lang="fr-FR" dirty="0"/>
-              <a:t>Écart-type : 11.44</a:t>
-            </a:r>
-          </a:p>
-          <a:p>
-            <a:r>
-              <a:rPr lang="fr-FR" dirty="0"/>
-              <a:t>Minimum : 0.00</a:t>
-            </a:r>
-          </a:p>
-          <a:p>
-            <a:r>
-              <a:rPr lang="fr-FR" dirty="0"/>
-              <a:t>25% : 10.87</a:t>
-            </a:r>
-          </a:p>
-          <a:p>
-            <a:r>
-              <a:rPr lang="fr-FR" dirty="0"/>
-              <a:t>Médiane : 20.07</a:t>
-            </a:r>
-          </a:p>
-          <a:p>
-            <a:r>
-              <a:rPr lang="fr-FR" dirty="0"/>
-              <a:t>75% : 30.68</a:t>
-            </a:r>
-          </a:p>
-          <a:p>
-            <a:r>
-              <a:rPr lang="fr-FR" dirty="0"/>
-              <a:t>Maximum : 39.98</a:t>
-            </a:r>
-          </a:p>
-          <a:p>
-            <a:r>
-              <a:rPr lang="fr-FR" dirty="0"/>
-              <a:t>Ensemble de Données 2</a:t>
-            </a:r>
-          </a:p>
-          <a:p>
-            <a:r>
-              <a:rPr lang="fr-FR" dirty="0"/>
-              <a:t>Aperçu des données :</a:t>
-            </a:r>
-          </a:p>
-          <a:p>
-            <a:endParaRPr lang="fr-FR" dirty="0"/>
-          </a:p>
-          <a:p>
-            <a:r>
-              <a:rPr lang="fr-FR" dirty="0"/>
-              <a:t>Nombre d'entrées : 1000</a:t>
-            </a:r>
-          </a:p>
-          <a:p>
-            <a:r>
-              <a:rPr lang="fr-FR" dirty="0"/>
-              <a:t>Colonnes : </a:t>
-            </a:r>
-            <a:r>
-              <a:rPr lang="fr-FR" dirty="0" err="1"/>
-              <a:t>name</a:t>
-            </a:r>
-            <a:r>
-              <a:rPr lang="fr-FR" dirty="0"/>
-              <a:t>, </a:t>
-            </a:r>
-            <a:r>
-              <a:rPr lang="fr-FR" dirty="0" err="1"/>
-              <a:t>price</a:t>
-            </a:r>
-            <a:r>
-              <a:rPr lang="fr-FR" dirty="0"/>
-              <a:t>, profit</a:t>
-            </a:r>
-          </a:p>
-          <a:p>
-            <a:r>
-              <a:rPr lang="fr-FR" dirty="0"/>
-              <a:t>Types de données : </a:t>
-            </a:r>
-            <a:r>
-              <a:rPr lang="fr-FR" dirty="0" err="1"/>
-              <a:t>name</a:t>
-            </a:r>
-            <a:r>
-              <a:rPr lang="fr-FR" dirty="0"/>
-              <a:t> (</a:t>
-            </a:r>
-            <a:r>
-              <a:rPr lang="fr-FR" dirty="0" err="1"/>
-              <a:t>object</a:t>
-            </a:r>
-            <a:r>
-              <a:rPr lang="fr-FR" dirty="0"/>
-              <a:t>), </a:t>
-            </a:r>
-            <a:r>
-              <a:rPr lang="fr-FR" dirty="0" err="1"/>
-              <a:t>price</a:t>
-            </a:r>
-            <a:r>
-              <a:rPr lang="fr-FR" dirty="0"/>
-              <a:t> (float64), profit (float64)</a:t>
-            </a:r>
-          </a:p>
-          <a:p>
-            <a:r>
-              <a:rPr lang="fr-FR" dirty="0"/>
-              <a:t>Statistiques descriptives :</a:t>
-            </a:r>
-          </a:p>
-          <a:p>
-            <a:endParaRPr lang="fr-FR" dirty="0"/>
-          </a:p>
-          <a:p>
-            <a:r>
-              <a:rPr lang="fr-FR" dirty="0"/>
-              <a:t>Prix :</a:t>
-            </a:r>
-          </a:p>
-          <a:p>
-            <a:r>
-              <a:rPr lang="fr-FR" dirty="0"/>
-              <a:t>Moyenne : 12.61</a:t>
-            </a:r>
-          </a:p>
-          <a:p>
-            <a:r>
-              <a:rPr lang="fr-FR" dirty="0"/>
-              <a:t>Écart-type : 16.24</a:t>
-            </a:r>
-          </a:p>
-          <a:p>
-            <a:r>
-              <a:rPr lang="fr-FR" dirty="0"/>
-              <a:t>Minimum : -9.95</a:t>
-            </a:r>
-          </a:p>
-          <a:p>
-            <a:r>
-              <a:rPr lang="fr-FR" dirty="0"/>
-              <a:t>25% : 0.00</a:t>
-            </a:r>
-          </a:p>
-          <a:p>
-            <a:r>
-              <a:rPr lang="fr-FR" dirty="0"/>
-              <a:t>Médiane : 9.37</a:t>
-            </a:r>
-          </a:p>
-          <a:p>
-            <a:r>
-              <a:rPr lang="fr-FR" dirty="0"/>
-              <a:t>75% : 27.16</a:t>
-            </a:r>
-          </a:p>
-          <a:p>
-            <a:r>
-              <a:rPr lang="fr-FR" dirty="0"/>
-              <a:t>Maximum : 51.46</a:t>
-            </a:r>
-          </a:p>
-          <a:p>
-            <a:r>
-              <a:rPr lang="fr-FR" dirty="0"/>
-              <a:t>Profit :</a:t>
-            </a:r>
-          </a:p>
-          <a:p>
-            <a:r>
-              <a:rPr lang="fr-FR" dirty="0"/>
-              <a:t>Moyenne : 19.66</a:t>
-            </a:r>
-          </a:p>
-          <a:p>
-            <a:r>
-              <a:rPr lang="fr-FR" dirty="0"/>
-              <a:t>Écart-type : 11.92</a:t>
-            </a:r>
-          </a:p>
-          <a:p>
-            <a:r>
-              <a:rPr lang="fr-FR" dirty="0"/>
-              <a:t>Minimum : 0.15</a:t>
-            </a:r>
-          </a:p>
-          <a:p>
-            <a:r>
-              <a:rPr lang="fr-FR" dirty="0"/>
-              <a:t>25% : 8.98</a:t>
-            </a:r>
-          </a:p>
-          <a:p>
-            <a:r>
-              <a:rPr lang="fr-FR" dirty="0"/>
-              <a:t>Médiane : 19.81</a:t>
-            </a:r>
-          </a:p>
-          <a:p>
-            <a:r>
-              <a:rPr lang="fr-FR" dirty="0"/>
-              <a:t>75% : 30.57</a:t>
-            </a:r>
-          </a:p>
-          <a:p>
-            <a:r>
-              <a:rPr lang="fr-FR" dirty="0"/>
-              <a:t>Maximum : 39.98</a:t>
-            </a:r>
-          </a:p>
-        </p:txBody>
-      </p:sp>
+            <p:extLst>
+              <p:ext uri="{D42A27DB-BD31-4B8C-83A1-F6EECF244321}">
+                <p14:modId xmlns:p14="http://schemas.microsoft.com/office/powerpoint/2010/main" val="2770533739"/>
+              </p:ext>
+            </p:extLst>
+          </p:nvPr>
+        </p:nvGraphicFramePr>
+        <p:xfrm>
+          <a:off x="457200" y="1600200"/>
+          <a:ext cx="8229600" cy="4851400"/>
+        </p:xfrm>
+        <a:graphic>
+          <a:graphicData uri="http://schemas.openxmlformats.org/drawingml/2006/table">
+            <a:tbl>
+              <a:tblPr firstRow="1" bandRow="1">
+                <a:tableStyleId>{5C22544A-7EE6-4342-B048-85BDC9FD1C3A}</a:tableStyleId>
+              </a:tblPr>
+              <a:tblGrid>
+                <a:gridCol w="4114800">
+                  <a:extLst>
+                    <a:ext uri="{9D8B030D-6E8A-4147-A177-3AD203B41FA5}">
+                      <a16:colId xmlns:a16="http://schemas.microsoft.com/office/drawing/2014/main" val="468074253"/>
+                    </a:ext>
+                  </a:extLst>
+                </a:gridCol>
+                <a:gridCol w="4114800">
+                  <a:extLst>
+                    <a:ext uri="{9D8B030D-6E8A-4147-A177-3AD203B41FA5}">
+                      <a16:colId xmlns:a16="http://schemas.microsoft.com/office/drawing/2014/main" val="3370025350"/>
+                    </a:ext>
+                  </a:extLst>
+                </a:gridCol>
+              </a:tblGrid>
+              <a:tr h="370840">
+                <a:tc>
+                  <a:txBody>
+                    <a:bodyPr/>
+                    <a:lstStyle/>
+                    <a:p>
+                      <a:pPr marL="0" marR="0" lvl="0" indent="0" algn="l" defTabSz="457200" rtl="0" eaLnBrk="1" fontAlgn="auto" latinLnBrk="0" hangingPunct="1">
+                        <a:lnSpc>
+                          <a:spcPct val="100000"/>
+                        </a:lnSpc>
+                        <a:spcBef>
+                          <a:spcPts val="0"/>
+                        </a:spcBef>
+                        <a:spcAft>
+                          <a:spcPts val="0"/>
+                        </a:spcAft>
+                        <a:buClrTx/>
+                        <a:buSzTx/>
+                        <a:buFontTx/>
+                        <a:buNone/>
+                        <a:tabLst/>
+                        <a:defRPr/>
+                      </a:pPr>
+                      <a:r>
+                        <a:rPr lang="fr-FR" sz="1200" dirty="0"/>
+                        <a:t>Ensemble de Données 1</a:t>
+                      </a:r>
+                    </a:p>
+                  </a:txBody>
+                  <a:tcPr/>
+                </a:tc>
+                <a:tc>
+                  <a:txBody>
+                    <a:bodyPr/>
+                    <a:lstStyle/>
+                    <a:p>
+                      <a:pPr marL="0" marR="0" lvl="0" indent="0" algn="l" defTabSz="457200" rtl="0" eaLnBrk="1" fontAlgn="auto" latinLnBrk="0" hangingPunct="1">
+                        <a:lnSpc>
+                          <a:spcPct val="100000"/>
+                        </a:lnSpc>
+                        <a:spcBef>
+                          <a:spcPts val="0"/>
+                        </a:spcBef>
+                        <a:spcAft>
+                          <a:spcPts val="0"/>
+                        </a:spcAft>
+                        <a:buClrTx/>
+                        <a:buSzTx/>
+                        <a:buFontTx/>
+                        <a:buNone/>
+                        <a:tabLst/>
+                        <a:defRPr/>
+                      </a:pPr>
+                      <a:r>
+                        <a:rPr lang="fr-FR" sz="1200" dirty="0"/>
+                        <a:t>Ensemble de Données 2</a:t>
+                      </a:r>
+                    </a:p>
+                  </a:txBody>
+                  <a:tcPr/>
+                </a:tc>
+                <a:extLst>
+                  <a:ext uri="{0D108BD9-81ED-4DB2-BD59-A6C34878D82A}">
+                    <a16:rowId xmlns:a16="http://schemas.microsoft.com/office/drawing/2014/main" val="3082253910"/>
+                  </a:ext>
+                </a:extLst>
+              </a:tr>
+              <a:tr h="370840">
+                <a:tc>
+                  <a:txBody>
+                    <a:bodyPr/>
+                    <a:lstStyle/>
+                    <a:p>
+                      <a:r>
+                        <a:rPr lang="fr-FR" sz="1200" dirty="0"/>
+                        <a:t>Nombre d'entrées : 1001</a:t>
+                      </a:r>
+                    </a:p>
+                    <a:p>
+                      <a:r>
+                        <a:rPr lang="fr-FR" sz="1200" dirty="0"/>
+                        <a:t>Colonnes : </a:t>
+                      </a:r>
+                      <a:r>
+                        <a:rPr lang="fr-FR" sz="1200" dirty="0" err="1"/>
+                        <a:t>name</a:t>
+                      </a:r>
+                      <a:r>
+                        <a:rPr lang="fr-FR" sz="1200" dirty="0"/>
+                        <a:t>, </a:t>
+                      </a:r>
+                      <a:r>
+                        <a:rPr lang="fr-FR" sz="1200" dirty="0" err="1"/>
+                        <a:t>price</a:t>
+                      </a:r>
+                      <a:r>
+                        <a:rPr lang="fr-FR" sz="1200" dirty="0"/>
+                        <a:t>, profit</a:t>
+                      </a:r>
+                    </a:p>
+                    <a:p>
+                      <a:r>
+                        <a:rPr lang="fr-FR" sz="1200" dirty="0"/>
+                        <a:t>Types de données : </a:t>
+                      </a:r>
+                      <a:r>
+                        <a:rPr lang="fr-FR" sz="1200" dirty="0" err="1"/>
+                        <a:t>name</a:t>
+                      </a:r>
+                      <a:r>
+                        <a:rPr lang="fr-FR" sz="1200" dirty="0"/>
+                        <a:t> (</a:t>
+                      </a:r>
+                      <a:r>
+                        <a:rPr lang="fr-FR" sz="1200" dirty="0" err="1"/>
+                        <a:t>object</a:t>
+                      </a:r>
+                      <a:r>
+                        <a:rPr lang="fr-FR" sz="1200" dirty="0"/>
+                        <a:t>), </a:t>
+                      </a:r>
+                      <a:r>
+                        <a:rPr lang="fr-FR" sz="1200" dirty="0" err="1"/>
+                        <a:t>price</a:t>
+                      </a:r>
+                      <a:r>
+                        <a:rPr lang="fr-FR" sz="1200" dirty="0"/>
+                        <a:t> (float64), profit (float64)</a:t>
+                      </a:r>
+                    </a:p>
+                    <a:p>
+                      <a:endParaRPr lang="fr-FR" sz="1200" dirty="0"/>
+                    </a:p>
+                    <a:p>
+                      <a:r>
+                        <a:rPr lang="fr-FR" sz="1200" dirty="0"/>
+                        <a:t>Statistiques descriptives :</a:t>
+                      </a:r>
+                    </a:p>
+                    <a:p>
+                      <a:endParaRPr lang="fr-FR" sz="1200" dirty="0"/>
+                    </a:p>
+                    <a:p>
+                      <a:r>
+                        <a:rPr lang="fr-FR" sz="1200" dirty="0"/>
+                        <a:t>Prix :</a:t>
+                      </a:r>
+                    </a:p>
+                    <a:p>
+                      <a:r>
+                        <a:rPr lang="fr-FR" sz="1200" dirty="0"/>
+                        <a:t>Moyenne : 24.41</a:t>
+                      </a:r>
+                    </a:p>
+                    <a:p>
+                      <a:r>
+                        <a:rPr lang="fr-FR" sz="1200" dirty="0"/>
+                        <a:t>Écart-type : 19.65</a:t>
+                      </a:r>
+                    </a:p>
+                    <a:p>
+                      <a:r>
+                        <a:rPr lang="fr-FR" sz="1200" dirty="0"/>
+                        <a:t>Minimum : -2.73</a:t>
+                      </a:r>
+                    </a:p>
+                    <a:p>
+                      <a:r>
+                        <a:rPr lang="fr-FR" sz="1200" dirty="0"/>
+                        <a:t>25% : 15.17</a:t>
+                      </a:r>
+                    </a:p>
+                    <a:p>
+                      <a:r>
+                        <a:rPr lang="fr-FR" sz="1200" dirty="0"/>
+                        <a:t>Médiane : 24.87</a:t>
+                      </a:r>
+                    </a:p>
+                    <a:p>
+                      <a:r>
+                        <a:rPr lang="fr-FR" sz="1200" dirty="0"/>
+                        <a:t>75% : 33.55</a:t>
+                      </a:r>
+                    </a:p>
+                    <a:p>
+                      <a:r>
+                        <a:rPr lang="fr-FR" sz="1200" dirty="0"/>
+                        <a:t>Maximum : 498.76</a:t>
+                      </a:r>
+                    </a:p>
+                    <a:p>
+                      <a:endParaRPr lang="fr-FR" sz="1200" dirty="0"/>
+                    </a:p>
+                    <a:p>
+                      <a:r>
+                        <a:rPr lang="fr-FR" sz="1200" dirty="0"/>
+                        <a:t>Profit :</a:t>
+                      </a:r>
+                    </a:p>
+                    <a:p>
+                      <a:r>
+                        <a:rPr lang="fr-FR" sz="1200" dirty="0"/>
+                        <a:t>Moyenne : 20.33</a:t>
+                      </a:r>
+                    </a:p>
+                    <a:p>
+                      <a:r>
+                        <a:rPr lang="fr-FR" sz="1200" dirty="0"/>
+                        <a:t>Écart-type : 11.44</a:t>
+                      </a:r>
+                    </a:p>
+                    <a:p>
+                      <a:r>
+                        <a:rPr lang="fr-FR" sz="1200" dirty="0"/>
+                        <a:t>Minimum : 0.00</a:t>
+                      </a:r>
+                    </a:p>
+                    <a:p>
+                      <a:r>
+                        <a:rPr lang="fr-FR" sz="1200" dirty="0"/>
+                        <a:t>25% : 10.87</a:t>
+                      </a:r>
+                    </a:p>
+                    <a:p>
+                      <a:r>
+                        <a:rPr lang="fr-FR" sz="1200" dirty="0"/>
+                        <a:t>Médiane : 20.07</a:t>
+                      </a:r>
+                    </a:p>
+                    <a:p>
+                      <a:r>
+                        <a:rPr lang="fr-FR" sz="1200" dirty="0"/>
+                        <a:t>75% : 30.68</a:t>
+                      </a:r>
+                    </a:p>
+                    <a:p>
+                      <a:r>
+                        <a:rPr lang="fr-FR" sz="1200" dirty="0"/>
+                        <a:t>Maximum : 39.98</a:t>
+                      </a:r>
+                    </a:p>
+                  </a:txBody>
+                  <a:tcPr/>
+                </a:tc>
+                <a:tc>
+                  <a:txBody>
+                    <a:bodyPr/>
+                    <a:lstStyle/>
+                    <a:p>
+                      <a:r>
+                        <a:rPr lang="fr-FR" sz="1200" dirty="0"/>
+                        <a:t>Nombre d'entrées : 1000</a:t>
+                      </a:r>
+                    </a:p>
+                    <a:p>
+                      <a:r>
+                        <a:rPr lang="fr-FR" sz="1200" dirty="0"/>
+                        <a:t>Colonnes : </a:t>
+                      </a:r>
+                      <a:r>
+                        <a:rPr lang="fr-FR" sz="1200" dirty="0" err="1"/>
+                        <a:t>name</a:t>
+                      </a:r>
+                      <a:r>
+                        <a:rPr lang="fr-FR" sz="1200" dirty="0"/>
+                        <a:t>, </a:t>
+                      </a:r>
+                      <a:r>
+                        <a:rPr lang="fr-FR" sz="1200" dirty="0" err="1"/>
+                        <a:t>price</a:t>
+                      </a:r>
+                      <a:r>
+                        <a:rPr lang="fr-FR" sz="1200" dirty="0"/>
+                        <a:t>, profit</a:t>
+                      </a:r>
+                    </a:p>
+                    <a:p>
+                      <a:r>
+                        <a:rPr lang="fr-FR" sz="1200" dirty="0"/>
+                        <a:t>Types de données : </a:t>
+                      </a:r>
+                      <a:r>
+                        <a:rPr lang="fr-FR" sz="1200" dirty="0" err="1"/>
+                        <a:t>name</a:t>
+                      </a:r>
+                      <a:r>
+                        <a:rPr lang="fr-FR" sz="1200" dirty="0"/>
+                        <a:t> (</a:t>
+                      </a:r>
+                      <a:r>
+                        <a:rPr lang="fr-FR" sz="1200" dirty="0" err="1"/>
+                        <a:t>object</a:t>
+                      </a:r>
+                      <a:r>
+                        <a:rPr lang="fr-FR" sz="1200" dirty="0"/>
+                        <a:t>), </a:t>
+                      </a:r>
+                      <a:r>
+                        <a:rPr lang="fr-FR" sz="1200" dirty="0" err="1"/>
+                        <a:t>price</a:t>
+                      </a:r>
+                      <a:r>
+                        <a:rPr lang="fr-FR" sz="1200" dirty="0"/>
+                        <a:t> (float64), profit (</a:t>
+                      </a:r>
+                      <a:r>
+                        <a:rPr lang="fr-FR" sz="1200"/>
+                        <a:t>float64)</a:t>
+                      </a:r>
+                    </a:p>
+                    <a:p>
+                      <a:endParaRPr lang="fr-FR" sz="1200" dirty="0"/>
+                    </a:p>
+                    <a:p>
+                      <a:r>
+                        <a:rPr lang="fr-FR" sz="1200" dirty="0"/>
+                        <a:t>Statistiques descriptives :</a:t>
+                      </a:r>
+                    </a:p>
+                    <a:p>
+                      <a:endParaRPr lang="fr-FR" sz="1200" dirty="0"/>
+                    </a:p>
+                    <a:p>
+                      <a:r>
+                        <a:rPr lang="fr-FR" sz="1200" dirty="0"/>
+                        <a:t>Prix :</a:t>
+                      </a:r>
+                    </a:p>
+                    <a:p>
+                      <a:r>
+                        <a:rPr lang="fr-FR" sz="1200" dirty="0"/>
+                        <a:t>Moyenne : 12.61</a:t>
+                      </a:r>
+                    </a:p>
+                    <a:p>
+                      <a:r>
+                        <a:rPr lang="fr-FR" sz="1200" dirty="0"/>
+                        <a:t>Écart-type : 16.24</a:t>
+                      </a:r>
+                    </a:p>
+                    <a:p>
+                      <a:r>
+                        <a:rPr lang="fr-FR" sz="1200" dirty="0"/>
+                        <a:t>Minimum : -9.95</a:t>
+                      </a:r>
+                    </a:p>
+                    <a:p>
+                      <a:r>
+                        <a:rPr lang="fr-FR" sz="1200" dirty="0"/>
+                        <a:t>25% : 0.00</a:t>
+                      </a:r>
+                    </a:p>
+                    <a:p>
+                      <a:r>
+                        <a:rPr lang="fr-FR" sz="1200" dirty="0"/>
+                        <a:t>Médiane : 9.37</a:t>
+                      </a:r>
+                    </a:p>
+                    <a:p>
+                      <a:r>
+                        <a:rPr lang="fr-FR" sz="1200" dirty="0"/>
+                        <a:t>75% : 27.16</a:t>
+                      </a:r>
+                    </a:p>
+                    <a:p>
+                      <a:r>
+                        <a:rPr lang="fr-FR" sz="1200" dirty="0"/>
+                        <a:t>Maximum : 51.46</a:t>
+                      </a:r>
+                    </a:p>
+                    <a:p>
+                      <a:endParaRPr lang="fr-FR" sz="1200" dirty="0"/>
+                    </a:p>
+                    <a:p>
+                      <a:r>
+                        <a:rPr lang="fr-FR" sz="1200" dirty="0"/>
+                        <a:t>Profit :</a:t>
+                      </a:r>
+                    </a:p>
+                    <a:p>
+                      <a:r>
+                        <a:rPr lang="fr-FR" sz="1200" dirty="0"/>
+                        <a:t>Moyenne : 19.66</a:t>
+                      </a:r>
+                    </a:p>
+                    <a:p>
+                      <a:r>
+                        <a:rPr lang="fr-FR" sz="1200" dirty="0"/>
+                        <a:t>Écart-type : 11.92</a:t>
+                      </a:r>
+                    </a:p>
+                    <a:p>
+                      <a:r>
+                        <a:rPr lang="fr-FR" sz="1200" dirty="0"/>
+                        <a:t>Minimum : 0.15</a:t>
+                      </a:r>
+                    </a:p>
+                    <a:p>
+                      <a:r>
+                        <a:rPr lang="fr-FR" sz="1200" dirty="0"/>
+                        <a:t>25% : 8.98</a:t>
+                      </a:r>
+                    </a:p>
+                    <a:p>
+                      <a:r>
+                        <a:rPr lang="fr-FR" sz="1200" dirty="0"/>
+                        <a:t>Médiane : 19.81</a:t>
+                      </a:r>
+                    </a:p>
+                    <a:p>
+                      <a:r>
+                        <a:rPr lang="fr-FR" sz="1200" dirty="0"/>
+                        <a:t>75% : 30.57</a:t>
+                      </a:r>
+                    </a:p>
+                    <a:p>
+                      <a:r>
+                        <a:rPr lang="fr-FR" sz="1200" dirty="0"/>
+                        <a:t>Maximum : 39.98</a:t>
+                      </a:r>
+                    </a:p>
+                  </a:txBody>
+                  <a:tcPr/>
+                </a:tc>
+                <a:extLst>
+                  <a:ext uri="{0D108BD9-81ED-4DB2-BD59-A6C34878D82A}">
+                    <a16:rowId xmlns:a16="http://schemas.microsoft.com/office/drawing/2014/main" val="202075241"/>
+                  </a:ext>
+                </a:extLst>
+              </a:tr>
+            </a:tbl>
+          </a:graphicData>
+        </a:graphic>
+      </p:graphicFrame>
     </p:spTree>
     <p:extLst>
       <p:ext uri="{BB962C8B-B14F-4D97-AF65-F5344CB8AC3E}">
         <p14:creationId xmlns:p14="http://schemas.microsoft.com/office/powerpoint/2010/main" val="1315553961"/>
+      </p:ext>
+    </p:extLst>
+  </p:cSld>
+  <p:clrMapOvr>
+    <a:masterClrMapping/>
+  </p:clrMapOvr>
+</p:sld>
+</file>
+
+<file path=ppt/slides/slide9.xml><?xml version="1.0" encoding="utf-8"?>
+<p:sld xmlns:a="http://schemas.openxmlformats.org/drawingml/2006/main" xmlns:r="http://schemas.openxmlformats.org/officeDocument/2006/relationships" xmlns:p="http://schemas.openxmlformats.org/presentationml/2006/main">
+  <p:cSld>
+    <p:spTree>
+      <p:nvGrpSpPr>
+        <p:cNvPr id="1" name="">
+          <a:extLst>
+            <a:ext uri="{FF2B5EF4-FFF2-40B4-BE49-F238E27FC236}">
+              <a16:creationId xmlns:a16="http://schemas.microsoft.com/office/drawing/2014/main" id="{EF004394-4095-DCD4-FA4F-957B76A19573}"/>
+            </a:ext>
+          </a:extLst>
+        </p:cNvPr>
+        <p:cNvGrpSpPr/>
+        <p:nvPr/>
+      </p:nvGrpSpPr>
+      <p:grpSpPr>
+        <a:xfrm>
+          <a:off x="0" y="0"/>
+          <a:ext cx="0" cy="0"/>
+          <a:chOff x="0" y="0"/>
+          <a:chExt cx="0" cy="0"/>
+        </a:xfrm>
+      </p:grpSpPr>
+      <p:sp>
+        <p:nvSpPr>
+          <p:cNvPr id="2" name="Titre 1">
+            <a:extLst>
+              <a:ext uri="{FF2B5EF4-FFF2-40B4-BE49-F238E27FC236}">
+                <a16:creationId xmlns:a16="http://schemas.microsoft.com/office/drawing/2014/main" id="{F9C5265E-57C5-C111-6D70-69119B39A80C}"/>
+              </a:ext>
+            </a:extLst>
+          </p:cNvPr>
+          <p:cNvSpPr>
+            <a:spLocks noGrp="1"/>
+          </p:cNvSpPr>
+          <p:nvPr>
+            <p:ph type="title"/>
+          </p:nvPr>
+        </p:nvSpPr>
+        <p:spPr/>
+        <p:txBody>
+          <a:bodyPr>
+            <a:normAutofit fontScale="90000"/>
+          </a:bodyPr>
+          <a:lstStyle/>
+          <a:p>
+            <a:r>
+              <a:rPr lang="fr-FR" dirty="0"/>
+              <a:t>Rapport d'exploration de l'ensemble des données</a:t>
+            </a:r>
+          </a:p>
+        </p:txBody>
+      </p:sp>
+      <p:sp>
+        <p:nvSpPr>
+          <p:cNvPr id="3" name="Espace réservé du contenu 2">
+            <a:extLst>
+              <a:ext uri="{FF2B5EF4-FFF2-40B4-BE49-F238E27FC236}">
+                <a16:creationId xmlns:a16="http://schemas.microsoft.com/office/drawing/2014/main" id="{B7D88CD3-8E0A-B63D-4D52-B7D3ACF51B11}"/>
+              </a:ext>
+            </a:extLst>
+          </p:cNvPr>
+          <p:cNvSpPr>
+            <a:spLocks noGrp="1"/>
+          </p:cNvSpPr>
+          <p:nvPr>
+            <p:ph idx="1"/>
+          </p:nvPr>
+        </p:nvSpPr>
+        <p:spPr/>
+        <p:txBody>
+          <a:bodyPr>
+            <a:normAutofit/>
+          </a:bodyPr>
+          <a:lstStyle/>
+          <a:p>
+            <a:pPr marL="0" indent="0">
+              <a:buNone/>
+            </a:pPr>
+            <a:endParaRPr lang="fr-FR" dirty="0"/>
+          </a:p>
+          <a:p>
+            <a:endParaRPr lang="fr-FR" dirty="0"/>
+          </a:p>
+          <a:p>
+            <a:r>
+              <a:rPr lang="fr-FR" dirty="0"/>
+              <a:t>Ensemble de Données 2</a:t>
+            </a:r>
+          </a:p>
+          <a:p>
+            <a:r>
+              <a:rPr lang="fr-FR" dirty="0"/>
+              <a:t>Aperçu des données :</a:t>
+            </a:r>
+          </a:p>
+          <a:p>
+            <a:endParaRPr lang="fr-FR" dirty="0"/>
+          </a:p>
+          <a:p>
+            <a:endParaRPr lang="fr-FR" dirty="0"/>
+          </a:p>
+        </p:txBody>
+      </p:sp>
+    </p:spTree>
+    <p:extLst>
+      <p:ext uri="{BB962C8B-B14F-4D97-AF65-F5344CB8AC3E}">
+        <p14:creationId xmlns:p14="http://schemas.microsoft.com/office/powerpoint/2010/main" val="1937620319"/>
       </p:ext>
     </p:extLst>
   </p:cSld>

</xml_diff>